<commit_message>
Add chart titles and axis labels to all charts in Slides.pptx
Co-authored-by: alanpaul1382-sketch <261784266+alanpaul1382-sketch@users.noreply.github.com>
</commit_message>
<xml_diff>
--- a/Slides.pptx
+++ b/Slides.pptx
@@ -154,6 +154,21 @@
   <c:roundedCorners val="1"/>
   <c:style val="2"/>
   <c:chart>
+    <c:title>
+      <c:tx>
+        <c:rich>
+          <a:bodyPr/>
+          <a:lstStyle/>
+          <a:p>
+            <a:r>
+              <a:t>EdTech Market Size Comparison</a:t>
+            </a:r>
+          </a:p>
+        </c:rich>
+      </c:tx>
+      <c:layout/>
+      <c:overlay val="0"/>
+    </c:title>
     <c:autoTitleDeleted val="0"/>
     <c:plotArea>
       <c:layout/>
@@ -486,6 +501,21 @@
   <c:roundedCorners val="1"/>
   <c:style val="2"/>
   <c:chart>
+    <c:title>
+      <c:tx>
+        <c:rich>
+          <a:bodyPr/>
+          <a:lstStyle/>
+          <a:p>
+            <a:r>
+              <a:t>AI Cost-Benefit Analysis</a:t>
+            </a:r>
+          </a:p>
+        </c:rich>
+      </c:tx>
+      <c:layout/>
+      <c:overlay val="0"/>
+    </c:title>
     <c:autoTitleDeleted val="0"/>
     <c:plotArea>
       <c:layout/>
@@ -742,6 +772,21 @@
         </c:scaling>
         <c:delete val="0"/>
         <c:axPos val="b"/>
+        <c:title>
+          <c:tx>
+            <c:rich>
+              <a:bodyPr/>
+              <a:lstStyle/>
+              <a:p>
+                <a:r>
+                  <a:t>Year</a:t>
+                </a:r>
+              </a:p>
+            </c:rich>
+          </c:tx>
+          <c:layout/>
+          <c:overlay val="0"/>
+        </c:title>
         <c:numFmt formatCode="General" sourceLinked="0"/>
         <c:majorTickMark val="out"/>
         <c:minorTickMark val="none"/>
@@ -771,6 +816,21 @@
         <c:delete val="0"/>
         <c:axPos val="l"/>
         <c:majorGridlines/>
+        <c:title>
+          <c:tx>
+            <c:rich>
+              <a:bodyPr/>
+              <a:lstStyle/>
+              <a:p>
+                <a:r>
+                  <a:t>SGD (Millions)</a:t>
+                </a:r>
+              </a:p>
+            </c:rich>
+          </c:tx>
+          <c:layout/>
+          <c:overlay val="0"/>
+        </c:title>
         <c:numFmt formatCode="General" sourceLinked="1"/>
         <c:majorTickMark val="out"/>
         <c:minorTickMark val="none"/>
@@ -841,6 +901,21 @@
   <c:roundedCorners val="1"/>
   <c:style val="2"/>
   <c:chart>
+    <c:title>
+      <c:tx>
+        <c:rich>
+          <a:bodyPr/>
+          <a:lstStyle/>
+          <a:p>
+            <a:r>
+              <a:t>VR/AR Cost-Benefit Analysis</a:t>
+            </a:r>
+          </a:p>
+        </c:rich>
+      </c:tx>
+      <c:layout/>
+      <c:overlay val="0"/>
+    </c:title>
     <c:autoTitleDeleted val="0"/>
     <c:plotArea>
       <c:layout>
@@ -1083,6 +1158,21 @@
         </c:scaling>
         <c:delete val="0"/>
         <c:axPos val="b"/>
+        <c:title>
+          <c:tx>
+            <c:rich>
+              <a:bodyPr/>
+              <a:lstStyle/>
+              <a:p>
+                <a:r>
+                  <a:t>Year</a:t>
+                </a:r>
+              </a:p>
+            </c:rich>
+          </c:tx>
+          <c:layout/>
+          <c:overlay val="0"/>
+        </c:title>
         <c:numFmt formatCode="General" sourceLinked="0"/>
         <c:majorTickMark val="out"/>
         <c:minorTickMark val="none"/>
@@ -1102,6 +1192,21 @@
         <c:delete val="0"/>
         <c:axPos val="l"/>
         <c:majorGridlines/>
+        <c:title>
+          <c:tx>
+            <c:rich>
+              <a:bodyPr/>
+              <a:lstStyle/>
+              <a:p>
+                <a:r>
+                  <a:t>SGD (Millions)</a:t>
+                </a:r>
+              </a:p>
+            </c:rich>
+          </c:tx>
+          <c:layout/>
+          <c:overlay val="0"/>
+        </c:title>
         <c:numFmt formatCode="General" sourceLinked="1"/>
         <c:majorTickMark val="out"/>
         <c:minorTickMark val="none"/>
@@ -1162,6 +1267,21 @@
   <c:roundedCorners val="1"/>
   <c:style val="2"/>
   <c:chart>
+    <c:title>
+      <c:tx>
+        <c:rich>
+          <a:bodyPr/>
+          <a:lstStyle/>
+          <a:p>
+            <a:r>
+              <a:t>5G &amp; Edge Computing Cost-Benefit Analysis</a:t>
+            </a:r>
+          </a:p>
+        </c:rich>
+      </c:tx>
+      <c:layout/>
+      <c:overlay val="0"/>
+    </c:title>
     <c:autoTitleDeleted val="0"/>
     <c:plotArea>
       <c:layout/>
@@ -1418,6 +1538,21 @@
         </c:scaling>
         <c:delete val="0"/>
         <c:axPos val="b"/>
+        <c:title>
+          <c:tx>
+            <c:rich>
+              <a:bodyPr/>
+              <a:lstStyle/>
+              <a:p>
+                <a:r>
+                  <a:t>Year</a:t>
+                </a:r>
+              </a:p>
+            </c:rich>
+          </c:tx>
+          <c:layout/>
+          <c:overlay val="0"/>
+        </c:title>
         <c:numFmt formatCode="General" sourceLinked="0"/>
         <c:majorTickMark val="out"/>
         <c:minorTickMark val="none"/>
@@ -1447,6 +1582,21 @@
         <c:delete val="0"/>
         <c:axPos val="l"/>
         <c:majorGridlines/>
+        <c:title>
+          <c:tx>
+            <c:rich>
+              <a:bodyPr/>
+              <a:lstStyle/>
+              <a:p>
+                <a:r>
+                  <a:t>SGD (Millions)</a:t>
+                </a:r>
+              </a:p>
+            </c:rich>
+          </c:tx>
+          <c:layout/>
+          <c:overlay val="0"/>
+        </c:title>
         <c:numFmt formatCode="General" sourceLinked="1"/>
         <c:majorTickMark val="out"/>
         <c:minorTickMark val="none"/>
@@ -1507,6 +1657,21 @@
   <c:roundedCorners val="1"/>
   <c:style val="2"/>
   <c:chart>
+    <c:title>
+      <c:tx>
+        <c:rich>
+          <a:bodyPr/>
+          <a:lstStyle/>
+          <a:p>
+            <a:r>
+              <a:t>Blockchain Cost-Benefit Analysis</a:t>
+            </a:r>
+          </a:p>
+        </c:rich>
+      </c:tx>
+      <c:layout/>
+      <c:overlay val="0"/>
+    </c:title>
     <c:autoTitleDeleted val="0"/>
     <c:plotArea>
       <c:layout/>
@@ -1739,6 +1904,21 @@
         </c:scaling>
         <c:delete val="0"/>
         <c:axPos val="b"/>
+        <c:title>
+          <c:tx>
+            <c:rich>
+              <a:bodyPr/>
+              <a:lstStyle/>
+              <a:p>
+                <a:r>
+                  <a:t>Year</a:t>
+                </a:r>
+              </a:p>
+            </c:rich>
+          </c:tx>
+          <c:layout/>
+          <c:overlay val="0"/>
+        </c:title>
         <c:numFmt formatCode="General" sourceLinked="0"/>
         <c:majorTickMark val="out"/>
         <c:minorTickMark val="none"/>
@@ -1758,6 +1938,21 @@
         <c:delete val="0"/>
         <c:axPos val="l"/>
         <c:majorGridlines/>
+        <c:title>
+          <c:tx>
+            <c:rich>
+              <a:bodyPr/>
+              <a:lstStyle/>
+              <a:p>
+                <a:r>
+                  <a:t>SGD (Millions)</a:t>
+                </a:r>
+              </a:p>
+            </c:rich>
+          </c:tx>
+          <c:layout/>
+          <c:overlay val="0"/>
+        </c:title>
         <c:numFmt formatCode="General" sourceLinked="1"/>
         <c:majorTickMark val="out"/>
         <c:minorTickMark val="none"/>

</xml_diff>

<commit_message>
Add chart titles and axis labels to Slides.pptx; add update_charts.py script
Co-authored-by: alanpaul1382-sketch <261784266+alanpaul1382-sketch@users.noreply.github.com>
</commit_message>
<xml_diff>
--- a/Slides.pptx
+++ b/Slides.pptx
@@ -154,6 +154,21 @@
   <c:roundedCorners val="1"/>
   <c:style val="2"/>
   <c:chart>
+    <c:title>
+      <c:tx>
+        <c:rich>
+          <a:bodyPr/>
+          <a:lstStyle/>
+          <a:p>
+            <a:r>
+              <a:t>EdTech Market Size Comparison</a:t>
+            </a:r>
+          </a:p>
+        </c:rich>
+      </c:tx>
+      <c:layout/>
+      <c:overlay val="0"/>
+    </c:title>
     <c:autoTitleDeleted val="0"/>
     <c:plotArea>
       <c:layout/>
@@ -486,6 +501,21 @@
   <c:roundedCorners val="1"/>
   <c:style val="2"/>
   <c:chart>
+    <c:title>
+      <c:tx>
+        <c:rich>
+          <a:bodyPr/>
+          <a:lstStyle/>
+          <a:p>
+            <a:r>
+              <a:t>AI Cost-Benefit Analysis</a:t>
+            </a:r>
+          </a:p>
+        </c:rich>
+      </c:tx>
+      <c:layout/>
+      <c:overlay val="0"/>
+    </c:title>
     <c:autoTitleDeleted val="0"/>
     <c:plotArea>
       <c:layout/>
@@ -742,6 +772,21 @@
         </c:scaling>
         <c:delete val="0"/>
         <c:axPos val="b"/>
+        <c:title>
+          <c:tx>
+            <c:rich>
+              <a:bodyPr/>
+              <a:lstStyle/>
+              <a:p>
+                <a:r>
+                  <a:t>Year</a:t>
+                </a:r>
+              </a:p>
+            </c:rich>
+          </c:tx>
+          <c:layout/>
+          <c:overlay val="0"/>
+        </c:title>
         <c:numFmt formatCode="General" sourceLinked="0"/>
         <c:majorTickMark val="out"/>
         <c:minorTickMark val="none"/>
@@ -771,6 +816,21 @@
         <c:delete val="0"/>
         <c:axPos val="l"/>
         <c:majorGridlines/>
+        <c:title>
+          <c:tx>
+            <c:rich>
+              <a:bodyPr/>
+              <a:lstStyle/>
+              <a:p>
+                <a:r>
+                  <a:t>SGD (Millions)</a:t>
+                </a:r>
+              </a:p>
+            </c:rich>
+          </c:tx>
+          <c:layout/>
+          <c:overlay val="0"/>
+        </c:title>
         <c:numFmt formatCode="General" sourceLinked="1"/>
         <c:majorTickMark val="out"/>
         <c:minorTickMark val="none"/>
@@ -841,6 +901,21 @@
   <c:roundedCorners val="1"/>
   <c:style val="2"/>
   <c:chart>
+    <c:title>
+      <c:tx>
+        <c:rich>
+          <a:bodyPr/>
+          <a:lstStyle/>
+          <a:p>
+            <a:r>
+              <a:t>VR/AR Cost-Benefit Analysis</a:t>
+            </a:r>
+          </a:p>
+        </c:rich>
+      </c:tx>
+      <c:layout/>
+      <c:overlay val="0"/>
+    </c:title>
     <c:autoTitleDeleted val="0"/>
     <c:plotArea>
       <c:layout>
@@ -1083,6 +1158,21 @@
         </c:scaling>
         <c:delete val="0"/>
         <c:axPos val="b"/>
+        <c:title>
+          <c:tx>
+            <c:rich>
+              <a:bodyPr/>
+              <a:lstStyle/>
+              <a:p>
+                <a:r>
+                  <a:t>Year</a:t>
+                </a:r>
+              </a:p>
+            </c:rich>
+          </c:tx>
+          <c:layout/>
+          <c:overlay val="0"/>
+        </c:title>
         <c:numFmt formatCode="General" sourceLinked="0"/>
         <c:majorTickMark val="out"/>
         <c:minorTickMark val="none"/>
@@ -1102,6 +1192,21 @@
         <c:delete val="0"/>
         <c:axPos val="l"/>
         <c:majorGridlines/>
+        <c:title>
+          <c:tx>
+            <c:rich>
+              <a:bodyPr/>
+              <a:lstStyle/>
+              <a:p>
+                <a:r>
+                  <a:t>SGD (Millions)</a:t>
+                </a:r>
+              </a:p>
+            </c:rich>
+          </c:tx>
+          <c:layout/>
+          <c:overlay val="0"/>
+        </c:title>
         <c:numFmt formatCode="General" sourceLinked="1"/>
         <c:majorTickMark val="out"/>
         <c:minorTickMark val="none"/>
@@ -1162,6 +1267,21 @@
   <c:roundedCorners val="1"/>
   <c:style val="2"/>
   <c:chart>
+    <c:title>
+      <c:tx>
+        <c:rich>
+          <a:bodyPr/>
+          <a:lstStyle/>
+          <a:p>
+            <a:r>
+              <a:t>5G &amp; Edge Computing Cost-Benefit Analysis</a:t>
+            </a:r>
+          </a:p>
+        </c:rich>
+      </c:tx>
+      <c:layout/>
+      <c:overlay val="0"/>
+    </c:title>
     <c:autoTitleDeleted val="0"/>
     <c:plotArea>
       <c:layout/>
@@ -1418,6 +1538,21 @@
         </c:scaling>
         <c:delete val="0"/>
         <c:axPos val="b"/>
+        <c:title>
+          <c:tx>
+            <c:rich>
+              <a:bodyPr/>
+              <a:lstStyle/>
+              <a:p>
+                <a:r>
+                  <a:t>Year</a:t>
+                </a:r>
+              </a:p>
+            </c:rich>
+          </c:tx>
+          <c:layout/>
+          <c:overlay val="0"/>
+        </c:title>
         <c:numFmt formatCode="General" sourceLinked="0"/>
         <c:majorTickMark val="out"/>
         <c:minorTickMark val="none"/>
@@ -1447,6 +1582,21 @@
         <c:delete val="0"/>
         <c:axPos val="l"/>
         <c:majorGridlines/>
+        <c:title>
+          <c:tx>
+            <c:rich>
+              <a:bodyPr/>
+              <a:lstStyle/>
+              <a:p>
+                <a:r>
+                  <a:t>SGD (Millions)</a:t>
+                </a:r>
+              </a:p>
+            </c:rich>
+          </c:tx>
+          <c:layout/>
+          <c:overlay val="0"/>
+        </c:title>
         <c:numFmt formatCode="General" sourceLinked="1"/>
         <c:majorTickMark val="out"/>
         <c:minorTickMark val="none"/>
@@ -1507,6 +1657,21 @@
   <c:roundedCorners val="1"/>
   <c:style val="2"/>
   <c:chart>
+    <c:title>
+      <c:tx>
+        <c:rich>
+          <a:bodyPr/>
+          <a:lstStyle/>
+          <a:p>
+            <a:r>
+              <a:t>Blockchain Cost-Benefit Analysis</a:t>
+            </a:r>
+          </a:p>
+        </c:rich>
+      </c:tx>
+      <c:layout/>
+      <c:overlay val="0"/>
+    </c:title>
     <c:autoTitleDeleted val="0"/>
     <c:plotArea>
       <c:layout/>
@@ -1739,6 +1904,21 @@
         </c:scaling>
         <c:delete val="0"/>
         <c:axPos val="b"/>
+        <c:title>
+          <c:tx>
+            <c:rich>
+              <a:bodyPr/>
+              <a:lstStyle/>
+              <a:p>
+                <a:r>
+                  <a:t>Year</a:t>
+                </a:r>
+              </a:p>
+            </c:rich>
+          </c:tx>
+          <c:layout/>
+          <c:overlay val="0"/>
+        </c:title>
         <c:numFmt formatCode="General" sourceLinked="0"/>
         <c:majorTickMark val="out"/>
         <c:minorTickMark val="none"/>
@@ -1758,6 +1938,21 @@
         <c:delete val="0"/>
         <c:axPos val="l"/>
         <c:majorGridlines/>
+        <c:title>
+          <c:tx>
+            <c:rich>
+              <a:bodyPr/>
+              <a:lstStyle/>
+              <a:p>
+                <a:r>
+                  <a:t>SGD (Millions)</a:t>
+                </a:r>
+              </a:p>
+            </c:rich>
+          </c:tx>
+          <c:layout/>
+          <c:overlay val="0"/>
+        </c:title>
         <c:numFmt formatCode="General" sourceLinked="1"/>
         <c:majorTickMark val="out"/>
         <c:minorTickMark val="none"/>

</xml_diff>

<commit_message>
Fix slide 7 graph USD to SGD conversion, slide 12 chart data and alignment
Co-authored-by: alanpaul1382-sketch <261784266+alanpaul1382-sketch@users.noreply.github.com>
</commit_message>
<xml_diff>
--- a/Slides.pptx
+++ b/Slides.pptx
@@ -231,8 +231,7 @@
 Pacific</c:v>
                 </c:pt>
                 <c:pt idx="2">
-                  <c:v>Singapore
-(SGD B)</c:v>
+                  <c:v>Singapore</c:v>
                 </c:pt>
               </c:strCache>
             </c:strRef>
@@ -244,10 +243,10 @@
                 <c:formatCode>General</c:formatCode>
                 <c:ptCount val="3"/>
                 <c:pt idx="0">
-                  <c:v>340</c:v>
+                  <c:v>459.0</c:v>
                 </c:pt>
                 <c:pt idx="1">
-                  <c:v>115</c:v>
+                  <c:v>155.2</c:v>
                 </c:pt>
                 <c:pt idx="2">
                   <c:v>1.75</c:v>
@@ -325,8 +324,7 @@
 Pacific</c:v>
                 </c:pt>
                 <c:pt idx="2">
-                  <c:v>Singapore
-(SGD B)</c:v>
+                  <c:v>Singapore</c:v>
                 </c:pt>
               </c:strCache>
             </c:strRef>
@@ -338,10 +336,10 @@
                 <c:formatCode>General</c:formatCode>
                 <c:ptCount val="3"/>
                 <c:pt idx="0">
-                  <c:v>605</c:v>
+                  <c:v>816.8</c:v>
                 </c:pt>
                 <c:pt idx="1">
-                  <c:v>230</c:v>
+                  <c:v>310.5</c:v>
                 </c:pt>
                 <c:pt idx="2">
                   <c:v>3.5</c:v>
@@ -432,19 +430,7 @@
                 </a:pPr>
                 <a:r>
                   <a:rPr lang="en-SG" dirty="0"/>
-                  <a:t>Market Size</a:t>
-                </a:r>
-                <a:r>
-                  <a:rPr lang="en-SG" baseline="0" dirty="0"/>
-                  <a:t> (</a:t>
-                </a:r>
-                <a:r>
-                  <a:rPr lang="en-SG" baseline="0" dirty="0" err="1"/>
-                  <a:t>Bilions</a:t>
-                </a:r>
-                <a:r>
-                  <a:rPr lang="en-SG" baseline="0" dirty="0"/>
-                  <a:t>)</a:t>
+                  <a:t>Market Size (SGD Billions)</a:t>
                 </a:r>
               </a:p>
             </c:rich>
@@ -918,17 +904,7 @@
     </c:title>
     <c:autoTitleDeleted val="0"/>
     <c:plotArea>
-      <c:layout>
-        <c:manualLayout>
-          <c:layoutTarget val="inner"/>
-          <c:xMode val="edge"/>
-          <c:yMode val="edge"/>
-          <c:x val="7.848972003499563E-2"/>
-          <c:y val="6.9390105533683286E-2"/>
-          <c:w val="0.85459463400408286"/>
-          <c:h val="0.64763540299650046"/>
-        </c:manualLayout>
-      </c:layout>
+      <c:layout/>
       <c:barChart>
         <c:barDir val="col"/>
         <c:grouping val="clustered"/>
@@ -1004,19 +980,19 @@
                 <c:formatCode>General</c:formatCode>
                 <c:ptCount val="5"/>
                 <c:pt idx="0">
-                  <c:v>3.45</c:v>
+                  <c:v>3.6</c:v>
                 </c:pt>
                 <c:pt idx="1">
-                  <c:v>1.5</c:v>
+                  <c:v>0.4</c:v>
                 </c:pt>
                 <c:pt idx="2">
-                  <c:v>1.2</c:v>
+                  <c:v>0.4</c:v>
                 </c:pt>
                 <c:pt idx="3">
-                  <c:v>1</c:v>
+                  <c:v>0.4</c:v>
                 </c:pt>
                 <c:pt idx="4">
-                  <c:v>1</c:v>
+                  <c:v>0.4</c:v>
                 </c:pt>
               </c:numCache>
             </c:numRef>
@@ -1107,19 +1083,19 @@
                 <c:formatCode>General</c:formatCode>
                 <c:ptCount val="5"/>
                 <c:pt idx="0">
-                  <c:v>1</c:v>
+                  <c:v>1.5</c:v>
                 </c:pt>
                 <c:pt idx="1">
-                  <c:v>4</c:v>
+                  <c:v>3.5</c:v>
                 </c:pt>
                 <c:pt idx="2">
-                  <c:v>5.5</c:v>
+                  <c:v>3.5</c:v>
                 </c:pt>
                 <c:pt idx="3">
-                  <c:v>6</c:v>
+                  <c:v>3.5</c:v>
                 </c:pt>
                 <c:pt idx="4">
-                  <c:v>6.5</c:v>
+                  <c:v>3.5</c:v>
                 </c:pt>
               </c:numCache>
             </c:numRef>
@@ -1213,21 +1189,12 @@
         <c:tickLblPos val="nextTo"/>
         <c:crossAx val="-2068027336"/>
         <c:crosses val="autoZero"/>
-        <c:crossBetween val="midCat"/>
+        <c:crossBetween val="between"/>
       </c:valAx>
     </c:plotArea>
     <c:legend>
       <c:legendPos val="b"/>
-      <c:layout>
-        <c:manualLayout>
-          <c:xMode val="edge"/>
-          <c:yMode val="edge"/>
-          <c:x val="0.34762594779819184"/>
-          <c:y val="0.91625143536745401"/>
-          <c:w val="0.30474810440361622"/>
-          <c:h val="8.374856463254593E-2"/>
-        </c:manualLayout>
-      </c:layout>
+      <c:layout/>
       <c:overlay val="0"/>
       <c:txPr>
         <a:bodyPr/>
@@ -29907,7 +29874,7 @@
                 </a:solidFill>
                 <a:latin typeface="Calibri"/>
               </a:rPr>
-              <a:t>USD 340B → 605B</a:t>
+              <a:t>SGD 459B → 817B</a:t>
             </a:r>
           </a:p>
         </p:txBody>

</xml_diff>

<commit_message>
Fill all 22 slide speaker notes in Slides.pptx based on Context.docx and final.docx content
Co-authored-by: alanpaul1382-sketch <261784266+alanpaul1382-sketch@users.noreply.github.com>
</commit_message>
<xml_diff>
--- a/Slides.pptx
+++ b/Slides.pptx
@@ -2745,7 +2745,58 @@
           <a:bodyPr/>
           <a:lstStyle/>
           <a:p>
-            <a:endParaRPr lang="en-SG" dirty="0"/>
+            <a:r>
+              <a:t>Now let me cover the impact, ROI, and challenges for 5G and Edge Computing.</a:t>
+            </a:r>
+          </a:p>
+          <a:p/>
+          <a:p>
+            <a:r>
+              <a:t>The key benefits include: modernized campus infrastructure supporting next-generation applications, 10 to 15 percent energy cost savings via smart building management, foundational infrastructure for VR/AR, AI, and IoT initiatives, improved campus safety and security, and students gaining hands-on experience with 5G technology, enhancing their employability.</a:t>
+            </a:r>
+          </a:p>
+          <a:p/>
+          <a:p>
+            <a:r>
+              <a:t>For the financial analysis: the five-year net return is approximately SGD 4.8 million, representing a 67 percent return on total investment, with breakeven achieved in Year 3 to 4. The longer payback period reflects the infrastructure nature of this investment. Importantly, this infrastructure investment enables and accelerates the ROI of the other three technologies.</a:t>
+            </a:r>
+          </a:p>
+          <a:p/>
+          <a:p>
+            <a:r>
+              <a:t>The Year 1 investment is estimated at SGD 3.4 to 6.6 million, covering 5G infrastructure, edge computing servers, IoT sensors, network management systems, and integration with existing IT infrastructure.</a:t>
+            </a:r>
+          </a:p>
+          <a:p/>
+          <a:p>
+            <a:r>
+              <a:t>Key challenges include:</a:t>
+            </a:r>
+          </a:p>
+          <a:p>
+            <a:r>
+              <a:t>High Infrastructure Costs: NYP may need to partner with telcos like Singtel and StarHub to share costs.</a:t>
+            </a:r>
+          </a:p>
+          <a:p>
+            <a:r>
+              <a:t>Spectrum and Regulatory Issues: Private 5G networks require spectrum allocation from IMDA.</a:t>
+            </a:r>
+          </a:p>
+          <a:p>
+            <a:r>
+              <a:t>Cybersecurity Risks: Massive device connectivity increases the attack surface.</a:t>
+            </a:r>
+          </a:p>
+          <a:p>
+            <a:r>
+              <a:t>Technical Expertise: Managing 5G and edge computing requires specialized skills.</a:t>
+            </a:r>
+          </a:p>
+          <a:p>
+            <a:r>
+              <a:t>Interoperability: Ensuring seamless integration with existing campus systems is critical.</a:t>
+            </a:r>
           </a:p>
         </p:txBody>
       </p:sp>
@@ -2778,6 +2829,2390 @@
         <p14:creationId xmlns:p14="http://schemas.microsoft.com/office/powerpoint/2010/main" val="3488514516"/>
       </p:ext>
     </p:extLst>
+  </p:cSld>
+  <p:clrMapOvr>
+    <a:masterClrMapping/>
+  </p:clrMapOvr>
+</p:notes>
+</file>
+
+<file path=ppt/notesSlides/notesSlide10.xml><?xml version="1.0" encoding="utf-8"?>
+<p:notes xmlns:a="http://schemas.openxmlformats.org/drawingml/2006/main" xmlns:p="http://schemas.openxmlformats.org/presentationml/2006/main" xmlns:r="http://schemas.openxmlformats.org/officeDocument/2006/relationships">
+  <p:cSld>
+    <p:spTree>
+      <p:nvGrpSpPr>
+        <p:cNvPr id="1" name=""/>
+        <p:cNvGrpSpPr/>
+        <p:nvPr/>
+      </p:nvGrpSpPr>
+      <p:grpSpPr>
+        <a:xfrm>
+          <a:off x="0" y="0"/>
+          <a:ext cx="0" cy="0"/>
+          <a:chOff x="0" y="0"/>
+          <a:chExt cx="0" cy="0"/>
+        </a:xfrm>
+      </p:grpSpPr>
+      <p:sp>
+        <p:nvSpPr>
+          <p:cNvPr id="2" name="Slide Image Placeholder 1"/>
+          <p:cNvSpPr>
+            <a:spLocks noGrp="1"/>
+          </p:cNvSpPr>
+          <p:nvPr>
+            <p:ph type="sldImg" idx="2"/>
+          </p:nvPr>
+        </p:nvSpPr>
+        <p:spPr/>
+      </p:sp>
+      <p:sp>
+        <p:nvSpPr>
+          <p:cNvPr id="3" name="Notes Placeholder 2"/>
+          <p:cNvSpPr>
+            <a:spLocks noGrp="1"/>
+          </p:cNvSpPr>
+          <p:nvPr>
+            <p:ph type="body" idx="3" sz="quarter"/>
+          </p:nvPr>
+        </p:nvSpPr>
+        <p:spPr/>
+        <p:txBody>
+          <a:bodyPr/>
+          <a:lstStyle/>
+          <a:p>
+            <a:r>
+              <a:t>I am Clifton, the Team Lead, and I will be presenting on Artificial Intelligence.</a:t>
+            </a:r>
+          </a:p>
+          <a:p/>
+          <a:p>
+            <a:r>
+              <a:t>AI encompasses several key technologies relevant to education: Machine Learning algorithms that improve through experience, Natural Language Processing for understanding and generating human language, Computer Vision for interpreting visual information, and Generative AI for content creation and question answering.</a:t>
+            </a:r>
+          </a:p>
+          <a:p/>
+          <a:p>
+            <a:r>
+              <a:t>According to the IMDA Technology Roadmap, AI is identified as a critical enabler for Singapore's digital economy.</a:t>
+            </a:r>
+          </a:p>
+          <a:p/>
+          <a:p>
+            <a:r>
+              <a:t>There are four key applications of AI at NYP:</a:t>
+            </a:r>
+          </a:p>
+          <a:p/>
+          <a:p>
+            <a:r>
+              <a:t>First, Adaptive Learning Platforms: AI-powered systems can personalize the educational experience by analyzing individual learning patterns, recommending customized learning paths, adjusting difficulty levels in real time, and identifying at-risk students early for intervention.</a:t>
+            </a:r>
+          </a:p>
+          <a:p/>
+          <a:p>
+            <a:r>
+              <a:t>Second, AI Chatbots: NYP can deploy AI chatbots to handle routine student inquiries on course registration, financial aid, campus facilities, and IT support, providing 24/7 support and reducing administrative workload.</a:t>
+            </a:r>
+          </a:p>
+          <a:p/>
+          <a:p>
+            <a:r>
+              <a:t>Third, Automated Assessment: NLP-based tools can grade essays and written assignments with detailed feedback, and AI can auto-grade coding assignments, freeing up lecturers for higher-value activities.</a:t>
+            </a:r>
+          </a:p>
+          <a:p/>
+          <a:p>
+            <a:r>
+              <a:t>Fourth, Predictive Analytics: By analyzing historical data on attendance, grades, and engagement, AI models can predict which students are at risk of failing or dropping out, enabling targeted interventions.</a:t>
+            </a:r>
+          </a:p>
+          <a:p/>
+          <a:p>
+            <a:r>
+              <a:t>A real-world example: Georgia State University deployed an AI chatbot called Pounce, which reduced summer enrollment melt by 21 percent through proactive engagement.</a:t>
+            </a:r>
+          </a:p>
+        </p:txBody>
+      </p:sp>
+      <p:sp>
+        <p:nvSpPr>
+          <p:cNvPr id="4" name="Slide Number Placeholder 3"/>
+          <p:cNvSpPr>
+            <a:spLocks noGrp="1"/>
+          </p:cNvSpPr>
+          <p:nvPr>
+            <p:ph type="sldNum" idx="5" sz="quarter"/>
+          </p:nvPr>
+        </p:nvSpPr>
+        <p:spPr/>
+      </p:sp>
+    </p:spTree>
+  </p:cSld>
+  <p:clrMapOvr>
+    <a:masterClrMapping/>
+  </p:clrMapOvr>
+</p:notes>
+</file>
+
+<file path=ppt/notesSlides/notesSlide11.xml><?xml version="1.0" encoding="utf-8"?>
+<p:notes xmlns:a="http://schemas.openxmlformats.org/drawingml/2006/main" xmlns:p="http://schemas.openxmlformats.org/presentationml/2006/main" xmlns:r="http://schemas.openxmlformats.org/officeDocument/2006/relationships">
+  <p:cSld>
+    <p:spTree>
+      <p:nvGrpSpPr>
+        <p:cNvPr id="1" name=""/>
+        <p:cNvGrpSpPr/>
+        <p:nvPr/>
+      </p:nvGrpSpPr>
+      <p:grpSpPr>
+        <a:xfrm>
+          <a:off x="0" y="0"/>
+          <a:ext cx="0" cy="0"/>
+          <a:chOff x="0" y="0"/>
+          <a:chExt cx="0" cy="0"/>
+        </a:xfrm>
+      </p:grpSpPr>
+      <p:sp>
+        <p:nvSpPr>
+          <p:cNvPr id="2" name="Slide Image Placeholder 1"/>
+          <p:cNvSpPr>
+            <a:spLocks noGrp="1"/>
+          </p:cNvSpPr>
+          <p:nvPr>
+            <p:ph type="sldImg" idx="2"/>
+          </p:nvPr>
+        </p:nvSpPr>
+        <p:spPr/>
+      </p:sp>
+      <p:sp>
+        <p:nvSpPr>
+          <p:cNvPr id="3" name="Notes Placeholder 2"/>
+          <p:cNvSpPr>
+            <a:spLocks noGrp="1"/>
+          </p:cNvSpPr>
+          <p:nvPr>
+            <p:ph type="body" idx="3" sz="quarter"/>
+          </p:nvPr>
+        </p:nvSpPr>
+        <p:spPr/>
+        <p:txBody>
+          <a:bodyPr/>
+          <a:lstStyle/>
+          <a:p>
+            <a:r>
+              <a:t>Now let me cover the impact, ROI, and challenges for AI adoption at NYP.</a:t>
+            </a:r>
+          </a:p>
+          <a:p/>
+          <a:p>
+            <a:r>
+              <a:t>The key benefits include: improved student outcomes and retention rates with an estimated 10 to 15 percent improvement, reduced administrative costs through automation saving SGD 2 to 4 million per year, enhanced competitive positioning as an AI-forward institution, new revenue from AI-powered CET courses generating SGD 5 to 10 million per year, and personalized 24/7 learning and support for students through AI chatbots.</a:t>
+            </a:r>
+          </a:p>
+          <a:p/>
+          <a:p>
+            <a:r>
+              <a:t>For the financial analysis: the five-year net return is approximately SGD 15.6 million, representing a 226 percent return on total investment, with breakeven achieved within Year 2.</a:t>
+            </a:r>
+          </a:p>
+          <a:p/>
+          <a:p>
+            <a:r>
+              <a:t>However, there are key challenges to address:</a:t>
+            </a:r>
+          </a:p>
+          <a:p>
+            <a:r>
+              <a:t>Data Privacy and Ethics: AI systems require large amounts of student data, and NYP must ensure compliance with Singapore's Personal Data Protection Act.</a:t>
+            </a:r>
+          </a:p>
+          <a:p>
+            <a:r>
+              <a:t>Resistance to Change: Lecturers and staff may be resistant to AI tools they perceive as replacing their roles. Comprehensive change management and training programs are essential.</a:t>
+            </a:r>
+          </a:p>
+          <a:p>
+            <a:r>
+              <a:t>Data Quality: AI models are only as good as the data they are trained on, so NYP must invest in data governance.</a:t>
+            </a:r>
+          </a:p>
+          <a:p>
+            <a:r>
+              <a:t>Integration: AI solutions must integrate seamlessly with NYP's existing LMS and IT infrastructure.</a:t>
+            </a:r>
+          </a:p>
+        </p:txBody>
+      </p:sp>
+      <p:sp>
+        <p:nvSpPr>
+          <p:cNvPr id="4" name="Slide Number Placeholder 3"/>
+          <p:cNvSpPr>
+            <a:spLocks noGrp="1"/>
+          </p:cNvSpPr>
+          <p:nvPr>
+            <p:ph type="sldNum" idx="5" sz="quarter"/>
+          </p:nvPr>
+        </p:nvSpPr>
+        <p:spPr/>
+      </p:sp>
+    </p:spTree>
+  </p:cSld>
+  <p:clrMapOvr>
+    <a:masterClrMapping/>
+  </p:clrMapOvr>
+</p:notes>
+</file>
+
+<file path=ppt/notesSlides/notesSlide12.xml><?xml version="1.0" encoding="utf-8"?>
+<p:notes xmlns:a="http://schemas.openxmlformats.org/drawingml/2006/main" xmlns:p="http://schemas.openxmlformats.org/presentationml/2006/main" xmlns:r="http://schemas.openxmlformats.org/officeDocument/2006/relationships">
+  <p:cSld>
+    <p:spTree>
+      <p:nvGrpSpPr>
+        <p:cNvPr id="1" name=""/>
+        <p:cNvGrpSpPr/>
+        <p:nvPr/>
+      </p:nvGrpSpPr>
+      <p:grpSpPr>
+        <a:xfrm>
+          <a:off x="0" y="0"/>
+          <a:ext cx="0" cy="0"/>
+          <a:chOff x="0" y="0"/>
+          <a:chExt cx="0" cy="0"/>
+        </a:xfrm>
+      </p:grpSpPr>
+      <p:sp>
+        <p:nvSpPr>
+          <p:cNvPr id="2" name="Slide Image Placeholder 1"/>
+          <p:cNvSpPr>
+            <a:spLocks noGrp="1"/>
+          </p:cNvSpPr>
+          <p:nvPr>
+            <p:ph type="sldImg" idx="2"/>
+          </p:nvPr>
+        </p:nvSpPr>
+        <p:spPr/>
+      </p:sp>
+      <p:sp>
+        <p:nvSpPr>
+          <p:cNvPr id="3" name="Notes Placeholder 2"/>
+          <p:cNvSpPr>
+            <a:spLocks noGrp="1"/>
+          </p:cNvSpPr>
+          <p:nvPr>
+            <p:ph type="body" idx="3" sz="quarter"/>
+          </p:nvPr>
+        </p:nvSpPr>
+        <p:spPr/>
+        <p:txBody>
+          <a:bodyPr/>
+          <a:lstStyle/>
+          <a:p>
+            <a:r>
+              <a:t>Hi everyone, I am Collin, and I will be presenting on Immersive Media, specifically VR and AR.</a:t>
+            </a:r>
+          </a:p>
+          <a:p/>
+          <a:p>
+            <a:r>
+              <a:t>Immersive Media encompasses three types of technologies:</a:t>
+            </a:r>
+          </a:p>
+          <a:p>
+            <a:r>
+              <a:t>Virtual Reality fully immerses users in computer-generated 3D environments using headsets like Meta Quest and HTC Vive.</a:t>
+            </a:r>
+          </a:p>
+          <a:p>
+            <a:r>
+              <a:t>Augmented Reality overlays digital information onto the real world through devices such as smartphones, tablets, or AR glasses like Microsoft HoloLens and Apple Vision Pro.</a:t>
+            </a:r>
+          </a:p>
+          <a:p>
+            <a:r>
+              <a:t>Mixed Reality blends real and virtual worlds, allowing digital and physical objects to interact in real time.</a:t>
+            </a:r>
+          </a:p>
+          <a:p/>
+          <a:p>
+            <a:r>
+              <a:t>The global VR/AR market is projected to reach USD 300 billion by 2027, with education being one of the fastest-growing segments.</a:t>
+            </a:r>
+          </a:p>
+          <a:p/>
+          <a:p>
+            <a:r>
+              <a:t>There are four key applications at NYP:</a:t>
+            </a:r>
+          </a:p>
+          <a:p/>
+          <a:p>
+            <a:r>
+              <a:t>First, Virtual Labs: VR can create realistic virtual laboratories where students can practice engineering experiments, conduct chemistry and biology experiments safely, and simulate healthcare scenarios for nursing students.</a:t>
+            </a:r>
+          </a:p>
+          <a:p/>
+          <a:p>
+            <a:r>
+              <a:t>Second, Immersive Learning: AR can enhance classroom learning by overlaying 3D models of complex structures like human anatomy and machine components, allowing students to interact with virtual objects in real time.</a:t>
+            </a:r>
+          </a:p>
+          <a:p/>
+          <a:p>
+            <a:r>
+              <a:t>Third, Virtual Campus Tours: NYP can create VR-based virtual campus tours for prospective students, particularly valuable for attracting international students.</a:t>
+            </a:r>
+          </a:p>
+          <a:p/>
+          <a:p>
+            <a:r>
+              <a:t>Fourth, Industry Training Simulations: NYP can develop VR training simulations for CET programs targeting industries such as aviation, construction, and hospitality, which can be licensed to industry partners.</a:t>
+            </a:r>
+          </a:p>
+          <a:p/>
+          <a:p>
+            <a:r>
+              <a:t>Key fact: VR/AR training improves knowledge retention by 75 percent compared to traditional methods, according to PwC 2022.</a:t>
+            </a:r>
+          </a:p>
+          <a:p/>
+          <a:p>
+            <a:r>
+              <a:t>Real-world examples include Labster, used by over 3,000 institutions with 200+ virtual lab experiments, and Microsoft HoloLens for 3D holographic anatomy in medical schools.</a:t>
+            </a:r>
+          </a:p>
+        </p:txBody>
+      </p:sp>
+      <p:sp>
+        <p:nvSpPr>
+          <p:cNvPr id="4" name="Slide Number Placeholder 3"/>
+          <p:cNvSpPr>
+            <a:spLocks noGrp="1"/>
+          </p:cNvSpPr>
+          <p:nvPr>
+            <p:ph type="sldNum" idx="5" sz="quarter"/>
+          </p:nvPr>
+        </p:nvSpPr>
+        <p:spPr/>
+      </p:sp>
+    </p:spTree>
+  </p:cSld>
+  <p:clrMapOvr>
+    <a:masterClrMapping/>
+  </p:clrMapOvr>
+</p:notes>
+</file>
+
+<file path=ppt/notesSlides/notesSlide13.xml><?xml version="1.0" encoding="utf-8"?>
+<p:notes xmlns:a="http://schemas.openxmlformats.org/drawingml/2006/main" xmlns:p="http://schemas.openxmlformats.org/presentationml/2006/main" xmlns:r="http://schemas.openxmlformats.org/officeDocument/2006/relationships">
+  <p:cSld>
+    <p:spTree>
+      <p:nvGrpSpPr>
+        <p:cNvPr id="1" name=""/>
+        <p:cNvGrpSpPr/>
+        <p:nvPr/>
+      </p:nvGrpSpPr>
+      <p:grpSpPr>
+        <a:xfrm>
+          <a:off x="0" y="0"/>
+          <a:ext cx="0" cy="0"/>
+          <a:chOff x="0" y="0"/>
+          <a:chExt cx="0" cy="0"/>
+        </a:xfrm>
+      </p:grpSpPr>
+      <p:sp>
+        <p:nvSpPr>
+          <p:cNvPr id="2" name="Slide Image Placeholder 1"/>
+          <p:cNvSpPr>
+            <a:spLocks noGrp="1"/>
+          </p:cNvSpPr>
+          <p:nvPr>
+            <p:ph type="sldImg" idx="2"/>
+          </p:nvPr>
+        </p:nvSpPr>
+        <p:spPr/>
+      </p:sp>
+      <p:sp>
+        <p:nvSpPr>
+          <p:cNvPr id="3" name="Notes Placeholder 2"/>
+          <p:cNvSpPr>
+            <a:spLocks noGrp="1"/>
+          </p:cNvSpPr>
+          <p:nvPr>
+            <p:ph type="body" idx="3" sz="quarter"/>
+          </p:nvPr>
+        </p:nvSpPr>
+        <p:spPr/>
+        <p:txBody>
+          <a:bodyPr/>
+          <a:lstStyle/>
+          <a:p>
+            <a:r>
+              <a:t>Now let me cover the impact, ROI, and challenges for VR/AR.</a:t>
+            </a:r>
+          </a:p>
+          <a:p/>
+          <a:p>
+            <a:r>
+              <a:t>The key benefits include: expanding practical training beyond physical lab limits, reducing equipment maintenance costs by 15 to 25 percent, achieving 75 percent better knowledge retention compared to traditional methods, generating B2B licensing revenue of SGD 2 to 5 million per year from industry training simulations, and enhancing student recruitment through virtual campus tours.</a:t>
+            </a:r>
+          </a:p>
+          <a:p/>
+          <a:p>
+            <a:r>
+              <a:t>For the financial analysis: the five-year net return is approximately SGD 10.3 million, representing a 198 percent return on total investment, with breakeven achieved within Year 2.</a:t>
+            </a:r>
+          </a:p>
+          <a:p/>
+          <a:p>
+            <a:r>
+              <a:t>The Year 1 investment is estimated at SGD 2.5 to 4.7 million, which includes VR headsets, virtual lab development, AR application development, content creation tools, and a dedicated VR/AR studio space.</a:t>
+            </a:r>
+          </a:p>
+          <a:p/>
+          <a:p>
+            <a:r>
+              <a:t>Key challenges include:</a:t>
+            </a:r>
+          </a:p>
+          <a:p>
+            <a:r>
+              <a:t>High Initial Investment: VR/AR hardware and content development require significant upfront investment.</a:t>
+            </a:r>
+          </a:p>
+          <a:p>
+            <a:r>
+              <a:t>Content Development: Creating high-quality, curriculum-aligned VR/AR content requires specialized skills in 3D modeling, UX design, and instructional design.</a:t>
+            </a:r>
+          </a:p>
+          <a:p>
+            <a:r>
+              <a:t>Motion Sickness and Accessibility: Some users experience VR-induced motion sickness, and NYP must ensure alternative access methods.</a:t>
+            </a:r>
+          </a:p>
+          <a:p>
+            <a:r>
+              <a:t>Hardware Refresh: VR/AR hardware evolves rapidly, requiring refresh cycles every 2 to 3 years.</a:t>
+            </a:r>
+          </a:p>
+          <a:p>
+            <a:r>
+              <a:t>Pedagogical Integration: Lecturers need training on how to effectively integrate VR/AR into their teaching methodology.</a:t>
+            </a:r>
+          </a:p>
+        </p:txBody>
+      </p:sp>
+      <p:sp>
+        <p:nvSpPr>
+          <p:cNvPr id="4" name="Slide Number Placeholder 3"/>
+          <p:cNvSpPr>
+            <a:spLocks noGrp="1"/>
+          </p:cNvSpPr>
+          <p:nvPr>
+            <p:ph type="sldNum" idx="5" sz="quarter"/>
+          </p:nvPr>
+        </p:nvSpPr>
+        <p:spPr/>
+      </p:sp>
+    </p:spTree>
+  </p:cSld>
+  <p:clrMapOvr>
+    <a:masterClrMapping/>
+  </p:clrMapOvr>
+</p:notes>
+</file>
+
+<file path=ppt/notesSlides/notesSlide14.xml><?xml version="1.0" encoding="utf-8"?>
+<p:notes xmlns:a="http://schemas.openxmlformats.org/drawingml/2006/main" xmlns:p="http://schemas.openxmlformats.org/presentationml/2006/main" xmlns:r="http://schemas.openxmlformats.org/officeDocument/2006/relationships">
+  <p:cSld>
+    <p:spTree>
+      <p:nvGrpSpPr>
+        <p:cNvPr id="1" name=""/>
+        <p:cNvGrpSpPr/>
+        <p:nvPr/>
+      </p:nvGrpSpPr>
+      <p:grpSpPr>
+        <a:xfrm>
+          <a:off x="0" y="0"/>
+          <a:ext cx="0" cy="0"/>
+          <a:chOff x="0" y="0"/>
+          <a:chExt cx="0" cy="0"/>
+        </a:xfrm>
+      </p:grpSpPr>
+      <p:sp>
+        <p:nvSpPr>
+          <p:cNvPr id="2" name="Slide Image Placeholder 1"/>
+          <p:cNvSpPr>
+            <a:spLocks noGrp="1"/>
+          </p:cNvSpPr>
+          <p:nvPr>
+            <p:ph type="sldImg" idx="2"/>
+          </p:nvPr>
+        </p:nvSpPr>
+        <p:spPr/>
+      </p:sp>
+      <p:sp>
+        <p:nvSpPr>
+          <p:cNvPr id="3" name="Notes Placeholder 2"/>
+          <p:cNvSpPr>
+            <a:spLocks noGrp="1"/>
+          </p:cNvSpPr>
+          <p:nvPr>
+            <p:ph type="body" idx="3" sz="quarter"/>
+          </p:nvPr>
+        </p:nvSpPr>
+        <p:spPr/>
+        <p:txBody>
+          <a:bodyPr/>
+          <a:lstStyle/>
+          <a:p>
+            <a:r>
+              <a:t>Hi, I am Alex, and I will be presenting on 5G and Edge Computing.</a:t>
+            </a:r>
+          </a:p>
+          <a:p/>
+          <a:p>
+            <a:r>
+              <a:t>5G is the latest generation of cellular technology, offering several key capabilities:</a:t>
+            </a:r>
+          </a:p>
+          <a:p>
+            <a:r>
+              <a:t>Ultra-high speeds of up to 20 Gbps, which is 20 times faster than 4G.</a:t>
+            </a:r>
+          </a:p>
+          <a:p>
+            <a:r>
+              <a:t>Ultra-low latency as low as 1 millisecond, compared to 30 to 50 milliseconds for 4G.</a:t>
+            </a:r>
+          </a:p>
+          <a:p>
+            <a:r>
+              <a:t>Massive device connectivity supporting up to 1 million devices per square kilometre.</a:t>
+            </a:r>
+          </a:p>
+          <a:p>
+            <a:r>
+              <a:t>Network slicing, which creates multiple virtual networks on a single physical infrastructure.</a:t>
+            </a:r>
+          </a:p>
+          <a:p/>
+          <a:p>
+            <a:r>
+              <a:t>Edge Computing brings computation and data storage closer to the sources of data, rather than relying on centralised cloud data centres. This reduces latency, improves response times, and supports real-time AI and VR applications.</a:t>
+            </a:r>
+          </a:p>
+          <a:p/>
+          <a:p>
+            <a:r>
+              <a:t>Singapore achieved nationwide standalone 5G coverage in 2025 through operators Singtel and StarHub.</a:t>
+            </a:r>
+          </a:p>
+          <a:p/>
+          <a:p>
+            <a:r>
+              <a:t>There are four key applications at NYP:</a:t>
+            </a:r>
+          </a:p>
+          <a:p/>
+          <a:p>
+            <a:r>
+              <a:t>Smart Campus Infrastructure: Deploy thousands of IoT sensors for real-time monitoring of air quality, temperature, lighting, and occupancy. AI-powered energy optimization can reduce campus energy consumption by 10 to 15 percent.</a:t>
+            </a:r>
+          </a:p>
+          <a:p/>
+          <a:p>
+            <a:r>
+              <a:t>Enhanced Hybrid Learning: 5G enables seamless 4K/8K lecture streaming, real-time collaboration, and live remote lab access with minimal latency.</a:t>
+            </a:r>
+          </a:p>
+          <a:p/>
+          <a:p>
+            <a:r>
+              <a:t>VR/AR and AI Enabler: 5G provides the high-bandwidth backbone essential for immersive VR/AR workloads and real-time AI applications.</a:t>
+            </a:r>
+          </a:p>
+          <a:p/>
+          <a:p>
+            <a:r>
+              <a:t>Campus Security: 5G-connected security systems with AI-powered video surveillance, automated access control, and emergency alert systems.</a:t>
+            </a:r>
+          </a:p>
+          <a:p/>
+          <a:p>
+            <a:r>
+              <a:t>Real-world example: NUS achieved 15 percent energy savings via smart building IoT and edge computing.</a:t>
+            </a:r>
+          </a:p>
+        </p:txBody>
+      </p:sp>
+      <p:sp>
+        <p:nvSpPr>
+          <p:cNvPr id="4" name="Slide Number Placeholder 3"/>
+          <p:cNvSpPr>
+            <a:spLocks noGrp="1"/>
+          </p:cNvSpPr>
+          <p:nvPr>
+            <p:ph type="sldNum" idx="5" sz="quarter"/>
+          </p:nvPr>
+        </p:nvSpPr>
+        <p:spPr/>
+      </p:sp>
+    </p:spTree>
+  </p:cSld>
+  <p:clrMapOvr>
+    <a:masterClrMapping/>
+  </p:clrMapOvr>
+</p:notes>
+</file>
+
+<file path=ppt/notesSlides/notesSlide15.xml><?xml version="1.0" encoding="utf-8"?>
+<p:notes xmlns:a="http://schemas.openxmlformats.org/drawingml/2006/main" xmlns:p="http://schemas.openxmlformats.org/presentationml/2006/main" xmlns:r="http://schemas.openxmlformats.org/officeDocument/2006/relationships">
+  <p:cSld>
+    <p:spTree>
+      <p:nvGrpSpPr>
+        <p:cNvPr id="1" name=""/>
+        <p:cNvGrpSpPr/>
+        <p:nvPr/>
+      </p:nvGrpSpPr>
+      <p:grpSpPr>
+        <a:xfrm>
+          <a:off x="0" y="0"/>
+          <a:ext cx="0" cy="0"/>
+          <a:chOff x="0" y="0"/>
+          <a:chExt cx="0" cy="0"/>
+        </a:xfrm>
+      </p:grpSpPr>
+      <p:sp>
+        <p:nvSpPr>
+          <p:cNvPr id="2" name="Slide Image Placeholder 1"/>
+          <p:cNvSpPr>
+            <a:spLocks noGrp="1"/>
+          </p:cNvSpPr>
+          <p:nvPr>
+            <p:ph type="sldImg" idx="2"/>
+          </p:nvPr>
+        </p:nvSpPr>
+        <p:spPr/>
+      </p:sp>
+      <p:sp>
+        <p:nvSpPr>
+          <p:cNvPr id="3" name="Notes Placeholder 2"/>
+          <p:cNvSpPr>
+            <a:spLocks noGrp="1"/>
+          </p:cNvSpPr>
+          <p:nvPr>
+            <p:ph type="body" idx="3" sz="quarter"/>
+          </p:nvPr>
+        </p:nvSpPr>
+        <p:spPr/>
+        <p:txBody>
+          <a:bodyPr/>
+          <a:lstStyle/>
+          <a:p>
+            <a:r>
+              <a:t>Hi, I am Declan, and I will be presenting on Blockchain-Based Certificate Verification.</a:t>
+            </a:r>
+          </a:p>
+          <a:p/>
+          <a:p>
+            <a:r>
+              <a:t>Let me first explain how blockchain works. Blockchain is a decentralised digital ledger commonly known for cryptocurrencies like Bitcoin, but it has many other uses including certificate verification.</a:t>
+            </a:r>
+          </a:p>
+          <a:p>
+            <a:r>
+              <a:t>It operates on a decentralized network of computers, called nodes, each having an entire copy of the ledger.</a:t>
+            </a:r>
+          </a:p>
+          <a:p>
+            <a:r>
+              <a:t>Data is grouped into blocks, each containing transactions and a cryptographic hash of the previous block, forming a chain.</a:t>
+            </a:r>
+          </a:p>
+          <a:p>
+            <a:r>
+              <a:t>Adding a block requires network consensus, making it tamper-proof. Once added, blocks cannot be modified or removed.</a:t>
+            </a:r>
+          </a:p>
+          <a:p/>
+          <a:p>
+            <a:r>
+              <a:t>There are four key applications at NYP:</a:t>
+            </a:r>
+          </a:p>
+          <a:p/>
+          <a:p>
+            <a:r>
+              <a:t>Digital Diplomas: NYP can issue all diplomas and certificates as blockchain-verifiable digital certificates. Each certificate is cryptographically signed and stored on blockchain. Employers can instantly verify authenticity without contacting NYP.</a:t>
+            </a:r>
+          </a:p>
+          <a:p/>
+          <a:p>
+            <a:r>
+              <a:t>Micro-Credentials: Blockchain enables issuance of granular, verifiable skill badges like Python Programming, Data Analysis, and Project Management. These are stackable and shareable on LinkedIn.</a:t>
+            </a:r>
+          </a:p>
+          <a:p/>
+          <a:p>
+            <a:r>
+              <a:t>Fast Verification: The current manual process takes 3 to 10 working days. With blockchain, an employer inputs the certificate hash and blockchain confirms authenticity in seconds.</a:t>
+            </a:r>
+          </a:p>
+          <a:p/>
+          <a:p>
+            <a:r>
+              <a:t>Academic Records: A blockchain-based system can store complete student transcripts, enable selective sharing of grades with employers, and facilitate credit transfer between institutions.</a:t>
+            </a:r>
+          </a:p>
+          <a:p/>
+          <a:p>
+            <a:r>
+              <a:t>NYP already participates in Singapore's OpenCerts platform but can expand to cover graduation diplomas, competition awards, CET certificates, internship certificates, and skill-based micro-credentials.</a:t>
+            </a:r>
+          </a:p>
+        </p:txBody>
+      </p:sp>
+      <p:sp>
+        <p:nvSpPr>
+          <p:cNvPr id="4" name="Slide Number Placeholder 3"/>
+          <p:cNvSpPr>
+            <a:spLocks noGrp="1"/>
+          </p:cNvSpPr>
+          <p:nvPr>
+            <p:ph type="sldNum" idx="5" sz="quarter"/>
+          </p:nvPr>
+        </p:nvSpPr>
+        <p:spPr/>
+      </p:sp>
+    </p:spTree>
+  </p:cSld>
+  <p:clrMapOvr>
+    <a:masterClrMapping/>
+  </p:clrMapOvr>
+</p:notes>
+</file>
+
+<file path=ppt/notesSlides/notesSlide16.xml><?xml version="1.0" encoding="utf-8"?>
+<p:notes xmlns:a="http://schemas.openxmlformats.org/drawingml/2006/main" xmlns:p="http://schemas.openxmlformats.org/presentationml/2006/main" xmlns:r="http://schemas.openxmlformats.org/officeDocument/2006/relationships">
+  <p:cSld>
+    <p:spTree>
+      <p:nvGrpSpPr>
+        <p:cNvPr id="1" name=""/>
+        <p:cNvGrpSpPr/>
+        <p:nvPr/>
+      </p:nvGrpSpPr>
+      <p:grpSpPr>
+        <a:xfrm>
+          <a:off x="0" y="0"/>
+          <a:ext cx="0" cy="0"/>
+          <a:chOff x="0" y="0"/>
+          <a:chExt cx="0" cy="0"/>
+        </a:xfrm>
+      </p:grpSpPr>
+      <p:sp>
+        <p:nvSpPr>
+          <p:cNvPr id="2" name="Slide Image Placeholder 1"/>
+          <p:cNvSpPr>
+            <a:spLocks noGrp="1"/>
+          </p:cNvSpPr>
+          <p:nvPr>
+            <p:ph type="sldImg" idx="2"/>
+          </p:nvPr>
+        </p:nvSpPr>
+        <p:spPr/>
+      </p:sp>
+      <p:sp>
+        <p:nvSpPr>
+          <p:cNvPr id="3" name="Notes Placeholder 2"/>
+          <p:cNvSpPr>
+            <a:spLocks noGrp="1"/>
+          </p:cNvSpPr>
+          <p:nvPr>
+            <p:ph type="body" idx="3" sz="quarter"/>
+          </p:nvPr>
+        </p:nvSpPr>
+        <p:spPr/>
+        <p:txBody>
+          <a:bodyPr/>
+          <a:lstStyle/>
+          <a:p>
+            <a:r>
+              <a:t>Now let me cover the impact, ROI, and challenges for Blockchain.</a:t>
+            </a:r>
+          </a:p>
+          <a:p/>
+          <a:p>
+            <a:r>
+              <a:t>The key benefits include:</a:t>
+            </a:r>
+          </a:p>
+          <a:p>
+            <a:r>
+              <a:t>For NYP: Elimination of manual verification workload with a 50 to 70 percent labour cut, enhanced institutional reputation through tamper-proof credentials, and alignment with Singapore's OpenCerts and Smart Nation initiatives.</a:t>
+            </a:r>
+          </a:p>
+          <a:p>
+            <a:r>
+              <a:t>For Students: Portable, cross-border credentials, protection against credential fraud, and granular skill-level credentials that showcase specific competencies.</a:t>
+            </a:r>
+          </a:p>
+          <a:p>
+            <a:r>
+              <a:t>For Employers: Instant verification of candidate qualifications in seconds instead of days, and elimination of the risk of hiring based on fake credentials.</a:t>
+            </a:r>
+          </a:p>
+          <a:p/>
+          <a:p>
+            <a:r>
+              <a:t>For the financial analysis: the five-year net return is approximately SGD 1.59 million, representing an 88 percent return on total investment, with breakeven achieved within Year 3. While the absolute figures are modest, the strategic value exceeds the financial return in terms of credibility and fraud elimination.</a:t>
+            </a:r>
+          </a:p>
+          <a:p/>
+          <a:p>
+            <a:r>
+              <a:t>The Year 1 investment is estimated at SGD 900K to 1.8 million, making it the lowest-cost technology in our proposal.</a:t>
+            </a:r>
+          </a:p>
+          <a:p/>
+          <a:p>
+            <a:r>
+              <a:t>Key challenges include:</a:t>
+            </a:r>
+          </a:p>
+          <a:p>
+            <a:r>
+              <a:t>Stakeholder Adoption: Success depends on employers and institutions accepting blockchain-verified credentials.</a:t>
+            </a:r>
+          </a:p>
+          <a:p>
+            <a:r>
+              <a:t>Interoperability: NYP must ensure compatibility with OpenCerts framework and international standards.</a:t>
+            </a:r>
+          </a:p>
+          <a:p>
+            <a:r>
+              <a:t>User Education: Students, staff, and employers need to understand how to use blockchain credentials.</a:t>
+            </a:r>
+          </a:p>
+          <a:p>
+            <a:r>
+              <a:t>Secure Cryptographic Hash: The hash must be secure enough to prevent information extraction.</a:t>
+            </a:r>
+          </a:p>
+        </p:txBody>
+      </p:sp>
+      <p:sp>
+        <p:nvSpPr>
+          <p:cNvPr id="4" name="Slide Number Placeholder 3"/>
+          <p:cNvSpPr>
+            <a:spLocks noGrp="1"/>
+          </p:cNvSpPr>
+          <p:nvPr>
+            <p:ph type="sldNum" idx="5" sz="quarter"/>
+          </p:nvPr>
+        </p:nvSpPr>
+        <p:spPr/>
+      </p:sp>
+    </p:spTree>
+  </p:cSld>
+  <p:clrMapOvr>
+    <a:masterClrMapping/>
+  </p:clrMapOvr>
+</p:notes>
+</file>
+
+<file path=ppt/notesSlides/notesSlide17.xml><?xml version="1.0" encoding="utf-8"?>
+<p:notes xmlns:a="http://schemas.openxmlformats.org/drawingml/2006/main" xmlns:p="http://schemas.openxmlformats.org/presentationml/2006/main" xmlns:r="http://schemas.openxmlformats.org/officeDocument/2006/relationships">
+  <p:cSld>
+    <p:spTree>
+      <p:nvGrpSpPr>
+        <p:cNvPr id="1" name=""/>
+        <p:cNvGrpSpPr/>
+        <p:nvPr/>
+      </p:nvGrpSpPr>
+      <p:grpSpPr>
+        <a:xfrm>
+          <a:off x="0" y="0"/>
+          <a:ext cx="0" cy="0"/>
+          <a:chOff x="0" y="0"/>
+          <a:chExt cx="0" cy="0"/>
+        </a:xfrm>
+      </p:grpSpPr>
+      <p:sp>
+        <p:nvSpPr>
+          <p:cNvPr id="2" name="Slide Image Placeholder 1"/>
+          <p:cNvSpPr>
+            <a:spLocks noGrp="1"/>
+          </p:cNvSpPr>
+          <p:nvPr>
+            <p:ph type="sldImg" idx="2"/>
+          </p:nvPr>
+        </p:nvSpPr>
+        <p:spPr/>
+      </p:sp>
+      <p:sp>
+        <p:nvSpPr>
+          <p:cNvPr id="3" name="Notes Placeholder 2"/>
+          <p:cNvSpPr>
+            <a:spLocks noGrp="1"/>
+          </p:cNvSpPr>
+          <p:nvPr>
+            <p:ph type="body" idx="3" sz="quarter"/>
+          </p:nvPr>
+        </p:nvSpPr>
+        <p:spPr/>
+        <p:txBody>
+          <a:bodyPr/>
+          <a:lstStyle/>
+          <a:p>
+            <a:r>
+              <a:t>We will now present our consolidated financials, the phased implementation plan, and how the four technologies create synergy together.</a:t>
+            </a:r>
+          </a:p>
+          <a:p/>
+          <a:p>
+            <a:r>
+              <a:t>This section brings together the investment requirements across all four technologies and outlines a practical roadmap for implementation over three years.</a:t>
+            </a:r>
+          </a:p>
+        </p:txBody>
+      </p:sp>
+      <p:sp>
+        <p:nvSpPr>
+          <p:cNvPr id="4" name="Slide Number Placeholder 3"/>
+          <p:cNvSpPr>
+            <a:spLocks noGrp="1"/>
+          </p:cNvSpPr>
+          <p:nvPr>
+            <p:ph type="sldNum" idx="5" sz="quarter"/>
+          </p:nvPr>
+        </p:nvSpPr>
+        <p:spPr/>
+      </p:sp>
+    </p:spTree>
+  </p:cSld>
+  <p:clrMapOvr>
+    <a:masterClrMapping/>
+  </p:clrMapOvr>
+</p:notes>
+</file>
+
+<file path=ppt/notesSlides/notesSlide18.xml><?xml version="1.0" encoding="utf-8"?>
+<p:notes xmlns:a="http://schemas.openxmlformats.org/drawingml/2006/main" xmlns:p="http://schemas.openxmlformats.org/presentationml/2006/main" xmlns:r="http://schemas.openxmlformats.org/officeDocument/2006/relationships">
+  <p:cSld>
+    <p:spTree>
+      <p:nvGrpSpPr>
+        <p:cNvPr id="1" name=""/>
+        <p:cNvGrpSpPr/>
+        <p:nvPr/>
+      </p:nvGrpSpPr>
+      <p:grpSpPr>
+        <a:xfrm>
+          <a:off x="0" y="0"/>
+          <a:ext cx="0" cy="0"/>
+          <a:chOff x="0" y="0"/>
+          <a:chExt cx="0" cy="0"/>
+        </a:xfrm>
+      </p:grpSpPr>
+      <p:sp>
+        <p:nvSpPr>
+          <p:cNvPr id="2" name="Slide Image Placeholder 1"/>
+          <p:cNvSpPr>
+            <a:spLocks noGrp="1"/>
+          </p:cNvSpPr>
+          <p:nvPr>
+            <p:ph type="sldImg" idx="2"/>
+          </p:nvPr>
+        </p:nvSpPr>
+        <p:spPr/>
+      </p:sp>
+      <p:sp>
+        <p:nvSpPr>
+          <p:cNvPr id="3" name="Notes Placeholder 2"/>
+          <p:cNvSpPr>
+            <a:spLocks noGrp="1"/>
+          </p:cNvSpPr>
+          <p:nvPr>
+            <p:ph type="body" idx="3" sz="quarter"/>
+          </p:nvPr>
+        </p:nvSpPr>
+        <p:spPr/>
+        <p:txBody>
+          <a:bodyPr/>
+          <a:lstStyle/>
+          <a:p>
+            <a:r>
+              <a:t>This slide shows our Consolidated Investment Summary across all four technologies.</a:t>
+            </a:r>
+          </a:p>
+          <a:p/>
+          <a:p>
+            <a:r>
+              <a:t>For AI: Year 1 investment of SGD 2.5 to 5 million, generating annual returns of SGD 5 to 10 million, with a five-year net return of SGD 15.6 million and breakeven in Year 2.</a:t>
+            </a:r>
+          </a:p>
+          <a:p/>
+          <a:p>
+            <a:r>
+              <a:t>For VR/AR: Year 1 investment of SGD 2.3 to 4.6 million, generating annual returns of SGD 2 to 5 million, with a five-year net return of SGD 10.3 million and breakeven in Year 2.</a:t>
+            </a:r>
+          </a:p>
+          <a:p/>
+          <a:p>
+            <a:r>
+              <a:t>For 5G and Edge Computing: Year 1 investment of SGD 3 to 5.5 million, generating annual returns of SGD 1.5 to 3 million, with a five-year net return of SGD 4.8 million and breakeven in Year 3 to 4.</a:t>
+            </a:r>
+          </a:p>
+          <a:p/>
+          <a:p>
+            <a:r>
+              <a:t>For Blockchain: Year 1 investment of SGD 1 to 2 million, generating annual returns of SGD 0.5 to 1 million, with a five-year net return of SGD 1.59 million and breakeven in Year 3.</a:t>
+            </a:r>
+          </a:p>
+          <a:p/>
+          <a:p>
+            <a:r>
+              <a:t>In total: Year 1 investment of SGD 8.8 to 17.1 million, projected annual returns of SGD 10.5 to 23 million, and a combined five-year net return of approximately SGD 32.3 million, with overall breakeven in Year 1 to 2.</a:t>
+            </a:r>
+          </a:p>
+        </p:txBody>
+      </p:sp>
+      <p:sp>
+        <p:nvSpPr>
+          <p:cNvPr id="4" name="Slide Number Placeholder 3"/>
+          <p:cNvSpPr>
+            <a:spLocks noGrp="1"/>
+          </p:cNvSpPr>
+          <p:nvPr>
+            <p:ph type="sldNum" idx="5" sz="quarter"/>
+          </p:nvPr>
+        </p:nvSpPr>
+        <p:spPr/>
+      </p:sp>
+    </p:spTree>
+  </p:cSld>
+  <p:clrMapOvr>
+    <a:masterClrMapping/>
+  </p:clrMapOvr>
+</p:notes>
+</file>
+
+<file path=ppt/notesSlides/notesSlide19.xml><?xml version="1.0" encoding="utf-8"?>
+<p:notes xmlns:a="http://schemas.openxmlformats.org/drawingml/2006/main" xmlns:p="http://schemas.openxmlformats.org/presentationml/2006/main" xmlns:r="http://schemas.openxmlformats.org/officeDocument/2006/relationships">
+  <p:cSld>
+    <p:spTree>
+      <p:nvGrpSpPr>
+        <p:cNvPr id="1" name=""/>
+        <p:cNvGrpSpPr/>
+        <p:nvPr/>
+      </p:nvGrpSpPr>
+      <p:grpSpPr>
+        <a:xfrm>
+          <a:off x="0" y="0"/>
+          <a:ext cx="0" cy="0"/>
+          <a:chOff x="0" y="0"/>
+          <a:chExt cx="0" cy="0"/>
+        </a:xfrm>
+      </p:grpSpPr>
+      <p:sp>
+        <p:nvSpPr>
+          <p:cNvPr id="2" name="Slide Image Placeholder 1"/>
+          <p:cNvSpPr>
+            <a:spLocks noGrp="1"/>
+          </p:cNvSpPr>
+          <p:nvPr>
+            <p:ph type="sldImg" idx="2"/>
+          </p:nvPr>
+        </p:nvSpPr>
+        <p:spPr/>
+      </p:sp>
+      <p:sp>
+        <p:nvSpPr>
+          <p:cNvPr id="3" name="Notes Placeholder 2"/>
+          <p:cNvSpPr>
+            <a:spLocks noGrp="1"/>
+          </p:cNvSpPr>
+          <p:nvPr>
+            <p:ph type="body" idx="3" sz="quarter"/>
+          </p:nvPr>
+        </p:nvSpPr>
+        <p:spPr/>
+        <p:txBody>
+          <a:bodyPr/>
+          <a:lstStyle/>
+          <a:p>
+            <a:r>
+              <a:t>Our implementation follows a phased three-year approach to manage risk and maximise ROI.</a:t>
+            </a:r>
+          </a:p>
+          <a:p/>
+          <a:p>
+            <a:r>
+              <a:t>Phase 1, Year 1 — Foundation:</a:t>
+            </a:r>
+          </a:p>
+          <a:p>
+            <a:r>
+              <a:t>We start with quick wins and lower-cost technologies.</a:t>
+            </a:r>
+          </a:p>
+          <a:p>
+            <a:r>
+              <a:t>Deploy an AI chatbot for student services to provide immediate 24/7 support.</a:t>
+            </a:r>
+          </a:p>
+          <a:p>
+            <a:r>
+              <a:t>Implement blockchain credentials building on the existing OpenCerts framework.</a:t>
+            </a:r>
+          </a:p>
+          <a:p>
+            <a:r>
+              <a:t>Begin 5G infrastructure planning and pilot with telco partners.</a:t>
+            </a:r>
+          </a:p>
+          <a:p>
+            <a:r>
+              <a:t>Develop the first VR lab prototypes for selected courses.</a:t>
+            </a:r>
+          </a:p>
+          <a:p/>
+          <a:p>
+            <a:r>
+              <a:t>Phase 2, Year 2 — Expansion:</a:t>
+            </a:r>
+          </a:p>
+          <a:p>
+            <a:r>
+              <a:t>Scale AI adaptive learning across all six schools.</a:t>
+            </a:r>
+          </a:p>
+          <a:p>
+            <a:r>
+              <a:t>Launch 10 or more VR virtual labs covering multiple disciplines.</a:t>
+            </a:r>
+          </a:p>
+          <a:p>
+            <a:r>
+              <a:t>Deploy 5G infrastructure campus-wide.</a:t>
+            </a:r>
+          </a:p>
+          <a:p>
+            <a:r>
+              <a:t>Expand blockchain to include micro-credentials and skill badges.</a:t>
+            </a:r>
+          </a:p>
+          <a:p/>
+          <a:p>
+            <a:r>
+              <a:t>Phase 3, Year 3 — Optimisation:</a:t>
+            </a:r>
+          </a:p>
+          <a:p>
+            <a:r>
+              <a:t>Integrate all technologies into a cohesive smart-campus ecosystem.</a:t>
+            </a:r>
+          </a:p>
+          <a:p>
+            <a:r>
+              <a:t>Monetise VR content through B2B licensing and blockchain verification services.</a:t>
+            </a:r>
+          </a:p>
+          <a:p>
+            <a:r>
+              <a:t>Conduct a comprehensive ROI evaluation and adjust the strategy based on results.</a:t>
+            </a:r>
+          </a:p>
+          <a:p/>
+          <a:p>
+            <a:r>
+              <a:t>This phased approach prioritizes quick-win, lower-cost technologies in Phase 1 while laying the groundwork for infrastructure-heavy initiatives.</a:t>
+            </a:r>
+          </a:p>
+        </p:txBody>
+      </p:sp>
+      <p:sp>
+        <p:nvSpPr>
+          <p:cNvPr id="4" name="Slide Number Placeholder 3"/>
+          <p:cNvSpPr>
+            <a:spLocks noGrp="1"/>
+          </p:cNvSpPr>
+          <p:nvPr>
+            <p:ph type="sldNum" idx="5" sz="quarter"/>
+          </p:nvPr>
+        </p:nvSpPr>
+        <p:spPr/>
+      </p:sp>
+    </p:spTree>
+  </p:cSld>
+  <p:clrMapOvr>
+    <a:masterClrMapping/>
+  </p:clrMapOvr>
+</p:notes>
+</file>
+
+<file path=ppt/notesSlides/notesSlide2.xml><?xml version="1.0" encoding="utf-8"?>
+<p:notes xmlns:a="http://schemas.openxmlformats.org/drawingml/2006/main" xmlns:p="http://schemas.openxmlformats.org/presentationml/2006/main" xmlns:r="http://schemas.openxmlformats.org/officeDocument/2006/relationships">
+  <p:cSld>
+    <p:spTree>
+      <p:nvGrpSpPr>
+        <p:cNvPr id="1" name=""/>
+        <p:cNvGrpSpPr/>
+        <p:nvPr/>
+      </p:nvGrpSpPr>
+      <p:grpSpPr>
+        <a:xfrm>
+          <a:off x="0" y="0"/>
+          <a:ext cx="0" cy="0"/>
+          <a:chOff x="0" y="0"/>
+          <a:chExt cx="0" cy="0"/>
+        </a:xfrm>
+      </p:grpSpPr>
+      <p:sp>
+        <p:nvSpPr>
+          <p:cNvPr id="2" name="Slide Image Placeholder 1"/>
+          <p:cNvSpPr>
+            <a:spLocks noGrp="1"/>
+          </p:cNvSpPr>
+          <p:nvPr>
+            <p:ph type="sldImg" idx="2"/>
+          </p:nvPr>
+        </p:nvSpPr>
+        <p:spPr/>
+      </p:sp>
+      <p:sp>
+        <p:nvSpPr>
+          <p:cNvPr id="3" name="Notes Placeholder 2"/>
+          <p:cNvSpPr>
+            <a:spLocks noGrp="1"/>
+          </p:cNvSpPr>
+          <p:nvPr>
+            <p:ph type="body" idx="3" sz="quarter"/>
+          </p:nvPr>
+        </p:nvSpPr>
+        <p:spPr/>
+        <p:txBody>
+          <a:bodyPr/>
+          <a:lstStyle/>
+          <a:p>
+            <a:r>
+              <a:t>Good morning/afternoon everyone. We are Group 6, and today we will be presenting our team proposal on Emerging Technologies for Nanyang Polytechnic.</a:t>
+            </a:r>
+          </a:p>
+          <a:p/>
+          <a:p>
+            <a:r>
+              <a:t>Our team consists of four members, each focusing on a specific emerging technology:</a:t>
+            </a:r>
+          </a:p>
+          <a:p>
+            <a:r>
+              <a:t>- Clifton Chen Yi, our Team Lead, covers Artificial Intelligence.</a:t>
+            </a:r>
+          </a:p>
+          <a:p>
+            <a:r>
+              <a:t>- Collin Koh Soon Ming focuses on Immersive Media, specifically VR and AR.</a:t>
+            </a:r>
+          </a:p>
+          <a:p>
+            <a:r>
+              <a:t>- Shin Thant Aung Alex handles 5G and Edge Computing.</a:t>
+            </a:r>
+          </a:p>
+          <a:p>
+            <a:r>
+              <a:t>- Declan Chua Yuan Lok is responsible for Blockchain-Based Certificate Verification.</a:t>
+            </a:r>
+          </a:p>
+          <a:p/>
+          <a:p>
+            <a:r>
+              <a:t>We chose Nanyang Polytechnic in the Education sector as our organization. Our proposal explores how these four frontier technologies, identified in the IMDA Technology Roadmap, can enhance NYP's educational offerings, improve operational efficiency, and maintain its competitive edge.</a:t>
+            </a:r>
+          </a:p>
+        </p:txBody>
+      </p:sp>
+      <p:sp>
+        <p:nvSpPr>
+          <p:cNvPr id="4" name="Slide Number Placeholder 3"/>
+          <p:cNvSpPr>
+            <a:spLocks noGrp="1"/>
+          </p:cNvSpPr>
+          <p:nvPr>
+            <p:ph type="sldNum" idx="5" sz="quarter"/>
+          </p:nvPr>
+        </p:nvSpPr>
+        <p:spPr/>
+      </p:sp>
+    </p:spTree>
+  </p:cSld>
+  <p:clrMapOvr>
+    <a:masterClrMapping/>
+  </p:clrMapOvr>
+</p:notes>
+</file>
+
+<file path=ppt/notesSlides/notesSlide20.xml><?xml version="1.0" encoding="utf-8"?>
+<p:notes xmlns:a="http://schemas.openxmlformats.org/drawingml/2006/main" xmlns:p="http://schemas.openxmlformats.org/presentationml/2006/main" xmlns:r="http://schemas.openxmlformats.org/officeDocument/2006/relationships">
+  <p:cSld>
+    <p:spTree>
+      <p:nvGrpSpPr>
+        <p:cNvPr id="1" name=""/>
+        <p:cNvGrpSpPr/>
+        <p:nvPr/>
+      </p:nvGrpSpPr>
+      <p:grpSpPr>
+        <a:xfrm>
+          <a:off x="0" y="0"/>
+          <a:ext cx="0" cy="0"/>
+          <a:chOff x="0" y="0"/>
+          <a:chExt cx="0" cy="0"/>
+        </a:xfrm>
+      </p:grpSpPr>
+      <p:sp>
+        <p:nvSpPr>
+          <p:cNvPr id="2" name="Slide Image Placeholder 1"/>
+          <p:cNvSpPr>
+            <a:spLocks noGrp="1"/>
+          </p:cNvSpPr>
+          <p:nvPr>
+            <p:ph type="sldImg" idx="2"/>
+          </p:nvPr>
+        </p:nvSpPr>
+        <p:spPr/>
+      </p:sp>
+      <p:sp>
+        <p:nvSpPr>
+          <p:cNvPr id="3" name="Notes Placeholder 2"/>
+          <p:cNvSpPr>
+            <a:spLocks noGrp="1"/>
+          </p:cNvSpPr>
+          <p:nvPr>
+            <p:ph type="body" idx="3" sz="quarter"/>
+          </p:nvPr>
+        </p:nvSpPr>
+        <p:spPr/>
+        <p:txBody>
+          <a:bodyPr/>
+          <a:lstStyle/>
+          <a:p>
+            <a:r>
+              <a:t>An important point is that the four technologies are not independent — they create a synergistic ecosystem.</a:t>
+            </a:r>
+          </a:p>
+          <a:p/>
+          <a:p>
+            <a:r>
+              <a:t>5G enables VR/AR: High-bandwidth, low-latency 5G connectivity is essential for seamless VR/AR experiences. Without 5G, immersive applications would face buffering and lag issues.</a:t>
+            </a:r>
+          </a:p>
+          <a:p/>
+          <a:p>
+            <a:r>
+              <a:t>AI enhances VR/AR: AI can personalize VR/AR learning scenarios based on individual student performance, creating truly adaptive immersive experiences.</a:t>
+            </a:r>
+          </a:p>
+          <a:p/>
+          <a:p>
+            <a:r>
+              <a:t>Edge Computing supports all: Edge servers provide the low-latency processing required by AI inference, VR rendering, and IoT data processing. This distributed computing approach ensures real-time responsiveness.</a:t>
+            </a:r>
+          </a:p>
+          <a:p/>
+          <a:p>
+            <a:r>
+              <a:t>Blockchain secures AI credentials: As AI-driven assessment becomes more prevalent, blockchain ensures the integrity and verifiability of AI-generated evaluations and credentials.</a:t>
+            </a:r>
+          </a:p>
+          <a:p/>
+          <a:p>
+            <a:r>
+              <a:t>By adopting these technologies in a coordinated manner, Nanyang Polytechnic can transform its operations, enhance the student experience, and secure its position as Singapore's leading polytechnic in the digital age. The synergy multiplier effect means the combined ROI exceeds the sum of individual technology returns.</a:t>
+            </a:r>
+          </a:p>
+        </p:txBody>
+      </p:sp>
+      <p:sp>
+        <p:nvSpPr>
+          <p:cNvPr id="4" name="Slide Number Placeholder 3"/>
+          <p:cNvSpPr>
+            <a:spLocks noGrp="1"/>
+          </p:cNvSpPr>
+          <p:nvPr>
+            <p:ph type="sldNum" idx="5" sz="quarter"/>
+          </p:nvPr>
+        </p:nvSpPr>
+        <p:spPr/>
+      </p:sp>
+    </p:spTree>
+  </p:cSld>
+  <p:clrMapOvr>
+    <a:masterClrMapping/>
+  </p:clrMapOvr>
+</p:notes>
+</file>
+
+<file path=ppt/notesSlides/notesSlide21.xml><?xml version="1.0" encoding="utf-8"?>
+<p:notes xmlns:a="http://schemas.openxmlformats.org/drawingml/2006/main" xmlns:p="http://schemas.openxmlformats.org/presentationml/2006/main" xmlns:r="http://schemas.openxmlformats.org/officeDocument/2006/relationships">
+  <p:cSld>
+    <p:spTree>
+      <p:nvGrpSpPr>
+        <p:cNvPr id="1" name=""/>
+        <p:cNvGrpSpPr/>
+        <p:nvPr/>
+      </p:nvGrpSpPr>
+      <p:grpSpPr>
+        <a:xfrm>
+          <a:off x="0" y="0"/>
+          <a:ext cx="0" cy="0"/>
+          <a:chOff x="0" y="0"/>
+          <a:chExt cx="0" cy="0"/>
+        </a:xfrm>
+      </p:grpSpPr>
+      <p:sp>
+        <p:nvSpPr>
+          <p:cNvPr id="2" name="Slide Image Placeholder 1"/>
+          <p:cNvSpPr>
+            <a:spLocks noGrp="1"/>
+          </p:cNvSpPr>
+          <p:nvPr>
+            <p:ph type="sldImg" idx="2"/>
+          </p:nvPr>
+        </p:nvSpPr>
+        <p:spPr/>
+      </p:sp>
+      <p:sp>
+        <p:nvSpPr>
+          <p:cNvPr id="3" name="Notes Placeholder 2"/>
+          <p:cNvSpPr>
+            <a:spLocks noGrp="1"/>
+          </p:cNvSpPr>
+          <p:nvPr>
+            <p:ph type="body" idx="3" sz="quarter"/>
+          </p:nvPr>
+        </p:nvSpPr>
+        <p:spPr/>
+        <p:txBody>
+          <a:bodyPr/>
+          <a:lstStyle/>
+          <a:p>
+            <a:r>
+              <a:t>In conclusion, our proposal demonstrates five key points.</a:t>
+            </a:r>
+          </a:p>
+          <a:p/>
+          <a:p>
+            <a:r>
+              <a:t>First, Comprehensive Coverage: The four technologies address NYP's core challenges across the entire value chain, from student recruitment to campus operations.</a:t>
+            </a:r>
+          </a:p>
+          <a:p/>
+          <a:p>
+            <a:r>
+              <a:t>Second, Strong ROI: The combined five-year net return is approximately SGD 32.3 million on an investment of SGD 8.8 to 17.1 million.</a:t>
+            </a:r>
+          </a:p>
+          <a:p/>
+          <a:p>
+            <a:r>
+              <a:t>Third, Managed Risk: Our phased three-year roadmap starts with quick wins first, specifically the AI chatbot and blockchain, before scaling to larger infrastructure investments.</a:t>
+            </a:r>
+          </a:p>
+          <a:p/>
+          <a:p>
+            <a:r>
+              <a:t>Fourth, Synergy Multiplier: The technology synergies create a multiplier effect on ROI, as each technology enhances the effectiveness of the others.</a:t>
+            </a:r>
+          </a:p>
+          <a:p/>
+          <a:p>
+            <a:r>
+              <a:t>Fifth, Market Leadership: This positions NYP as Singapore's leading polytechnic in the digital age.</a:t>
+            </a:r>
+          </a:p>
+          <a:p/>
+          <a:p>
+            <a:r>
+              <a:t>Our five recommendations are:</a:t>
+            </a:r>
+          </a:p>
+          <a:p>
+            <a:r>
+              <a:t>1. Approve Phase 1 funding of SGD 3 to 5 million for AI and Blockchain pilots.</a:t>
+            </a:r>
+          </a:p>
+          <a:p>
+            <a:r>
+              <a:t>2. Establish a Technology Steering Committee to oversee implementation.</a:t>
+            </a:r>
+          </a:p>
+          <a:p>
+            <a:r>
+              <a:t>3. Begin 5G partnership discussions with Singtel and StarHub.</a:t>
+            </a:r>
+          </a:p>
+          <a:p>
+            <a:r>
+              <a:t>4. Commission VR lab prototype development.</a:t>
+            </a:r>
+          </a:p>
+          <a:p>
+            <a:r>
+              <a:t>5. Set up a data governance framework for PDPA compliance.</a:t>
+            </a:r>
+          </a:p>
+          <a:p/>
+          <a:p>
+            <a:r>
+              <a:t>With these actions, NYP can embark on its digital transformation journey immediately.</a:t>
+            </a:r>
+          </a:p>
+        </p:txBody>
+      </p:sp>
+      <p:sp>
+        <p:nvSpPr>
+          <p:cNvPr id="4" name="Slide Number Placeholder 3"/>
+          <p:cNvSpPr>
+            <a:spLocks noGrp="1"/>
+          </p:cNvSpPr>
+          <p:nvPr>
+            <p:ph type="sldNum" idx="5" sz="quarter"/>
+          </p:nvPr>
+        </p:nvSpPr>
+        <p:spPr/>
+      </p:sp>
+    </p:spTree>
+  </p:cSld>
+  <p:clrMapOvr>
+    <a:masterClrMapping/>
+  </p:clrMapOvr>
+</p:notes>
+</file>
+
+<file path=ppt/notesSlides/notesSlide22.xml><?xml version="1.0" encoding="utf-8"?>
+<p:notes xmlns:a="http://schemas.openxmlformats.org/drawingml/2006/main" xmlns:p="http://schemas.openxmlformats.org/presentationml/2006/main" xmlns:r="http://schemas.openxmlformats.org/officeDocument/2006/relationships">
+  <p:cSld>
+    <p:spTree>
+      <p:nvGrpSpPr>
+        <p:cNvPr id="1" name=""/>
+        <p:cNvGrpSpPr/>
+        <p:nvPr/>
+      </p:nvGrpSpPr>
+      <p:grpSpPr>
+        <a:xfrm>
+          <a:off x="0" y="0"/>
+          <a:ext cx="0" cy="0"/>
+          <a:chOff x="0" y="0"/>
+          <a:chExt cx="0" cy="0"/>
+        </a:xfrm>
+      </p:grpSpPr>
+      <p:sp>
+        <p:nvSpPr>
+          <p:cNvPr id="2" name="Slide Image Placeholder 1"/>
+          <p:cNvSpPr>
+            <a:spLocks noGrp="1"/>
+          </p:cNvSpPr>
+          <p:nvPr>
+            <p:ph type="sldImg" idx="2"/>
+          </p:nvPr>
+        </p:nvSpPr>
+        <p:spPr/>
+      </p:sp>
+      <p:sp>
+        <p:nvSpPr>
+          <p:cNvPr id="3" name="Notes Placeholder 2"/>
+          <p:cNvSpPr>
+            <a:spLocks noGrp="1"/>
+          </p:cNvSpPr>
+          <p:nvPr>
+            <p:ph type="body" idx="3" sz="quarter"/>
+          </p:nvPr>
+        </p:nvSpPr>
+        <p:spPr/>
+        <p:txBody>
+          <a:bodyPr/>
+          <a:lstStyle/>
+          <a:p>
+            <a:r>
+              <a:t>Thank you for your attention. We hope our proposal has demonstrated the significant potential of these four emerging technologies for Nanyang Polytechnic.</a:t>
+            </a:r>
+          </a:p>
+          <a:p/>
+          <a:p>
+            <a:r>
+              <a:t>We are now happy to take any questions you may have. Each team member can address questions related to their respective technology area:</a:t>
+            </a:r>
+          </a:p>
+          <a:p>
+            <a:r>
+              <a:t>Clifton for Artificial Intelligence,</a:t>
+            </a:r>
+          </a:p>
+          <a:p>
+            <a:r>
+              <a:t>Collin for Virtual Reality and Augmented Reality,</a:t>
+            </a:r>
+          </a:p>
+          <a:p>
+            <a:r>
+              <a:t>Alex for 5G and Edge Computing, and</a:t>
+            </a:r>
+          </a:p>
+          <a:p>
+            <a:r>
+              <a:t>Declan for Blockchain.</a:t>
+            </a:r>
+          </a:p>
+          <a:p/>
+          <a:p>
+            <a:r>
+              <a:t>Thank you.</a:t>
+            </a:r>
+          </a:p>
+        </p:txBody>
+      </p:sp>
+      <p:sp>
+        <p:nvSpPr>
+          <p:cNvPr id="4" name="Slide Number Placeholder 3"/>
+          <p:cNvSpPr>
+            <a:spLocks noGrp="1"/>
+          </p:cNvSpPr>
+          <p:nvPr>
+            <p:ph type="sldNum" idx="5" sz="quarter"/>
+          </p:nvPr>
+        </p:nvSpPr>
+        <p:spPr/>
+      </p:sp>
+    </p:spTree>
+  </p:cSld>
+  <p:clrMapOvr>
+    <a:masterClrMapping/>
+  </p:clrMapOvr>
+</p:notes>
+</file>
+
+<file path=ppt/notesSlides/notesSlide3.xml><?xml version="1.0" encoding="utf-8"?>
+<p:notes xmlns:a="http://schemas.openxmlformats.org/drawingml/2006/main" xmlns:p="http://schemas.openxmlformats.org/presentationml/2006/main" xmlns:r="http://schemas.openxmlformats.org/officeDocument/2006/relationships">
+  <p:cSld>
+    <p:spTree>
+      <p:nvGrpSpPr>
+        <p:cNvPr id="1" name=""/>
+        <p:cNvGrpSpPr/>
+        <p:nvPr/>
+      </p:nvGrpSpPr>
+      <p:grpSpPr>
+        <a:xfrm>
+          <a:off x="0" y="0"/>
+          <a:ext cx="0" cy="0"/>
+          <a:chOff x="0" y="0"/>
+          <a:chExt cx="0" cy="0"/>
+        </a:xfrm>
+      </p:grpSpPr>
+      <p:sp>
+        <p:nvSpPr>
+          <p:cNvPr id="2" name="Slide Image Placeholder 1"/>
+          <p:cNvSpPr>
+            <a:spLocks noGrp="1"/>
+          </p:cNvSpPr>
+          <p:nvPr>
+            <p:ph type="sldImg" idx="2"/>
+          </p:nvPr>
+        </p:nvSpPr>
+        <p:spPr/>
+      </p:sp>
+      <p:sp>
+        <p:nvSpPr>
+          <p:cNvPr id="3" name="Notes Placeholder 2"/>
+          <p:cNvSpPr>
+            <a:spLocks noGrp="1"/>
+          </p:cNvSpPr>
+          <p:nvPr>
+            <p:ph type="body" idx="3" sz="quarter"/>
+          </p:nvPr>
+        </p:nvSpPr>
+        <p:spPr/>
+        <p:txBody>
+          <a:bodyPr/>
+          <a:lstStyle/>
+          <a:p>
+            <a:r>
+              <a:t>Here is our agenda for today's presentation. We will cover eight key sections.</a:t>
+            </a:r>
+          </a:p>
+          <a:p/>
+          <a:p>
+            <a:r>
+              <a:t>First, we will present the Executive Summary with our key findings and investment highlights.</a:t>
+            </a:r>
+          </a:p>
+          <a:p>
+            <a:r>
+              <a:t>Then we will profile Nanyang Polytechnic and its educational value chain.</a:t>
+            </a:r>
+          </a:p>
+          <a:p>
+            <a:r>
+              <a:t>Next, we will discuss six core problems and challenges NYP currently faces, mapped to the value chain.</a:t>
+            </a:r>
+          </a:p>
+          <a:p>
+            <a:r>
+              <a:t>We will then look at the market opportunity, including market sizing and revenue potential.</a:t>
+            </a:r>
+          </a:p>
+          <a:p>
+            <a:r>
+              <a:t>The core of our presentation covers the four technology solutions: AI, VR/AR, 5G and Edge Computing, and Blockchain.</a:t>
+            </a:r>
+          </a:p>
+          <a:p>
+            <a:r>
+              <a:t>After that, we will present the consolidated investment and ROI analysis.</a:t>
+            </a:r>
+          </a:p>
+          <a:p>
+            <a:r>
+              <a:t>We will outline our three-phase implementation roadmap and show how the technologies create synergy.</a:t>
+            </a:r>
+          </a:p>
+          <a:p>
+            <a:r>
+              <a:t>Finally, we will conclude with our recommendations and next steps.</a:t>
+            </a:r>
+          </a:p>
+        </p:txBody>
+      </p:sp>
+      <p:sp>
+        <p:nvSpPr>
+          <p:cNvPr id="4" name="Slide Number Placeholder 3"/>
+          <p:cNvSpPr>
+            <a:spLocks noGrp="1"/>
+          </p:cNvSpPr>
+          <p:nvPr>
+            <p:ph type="sldNum" idx="5" sz="quarter"/>
+          </p:nvPr>
+        </p:nvSpPr>
+        <p:spPr/>
+      </p:sp>
+    </p:spTree>
+  </p:cSld>
+  <p:clrMapOvr>
+    <a:masterClrMapping/>
+  </p:clrMapOvr>
+</p:notes>
+</file>
+
+<file path=ppt/notesSlides/notesSlide4.xml><?xml version="1.0" encoding="utf-8"?>
+<p:notes xmlns:a="http://schemas.openxmlformats.org/drawingml/2006/main" xmlns:p="http://schemas.openxmlformats.org/presentationml/2006/main" xmlns:r="http://schemas.openxmlformats.org/officeDocument/2006/relationships">
+  <p:cSld>
+    <p:spTree>
+      <p:nvGrpSpPr>
+        <p:cNvPr id="1" name=""/>
+        <p:cNvGrpSpPr/>
+        <p:nvPr/>
+      </p:nvGrpSpPr>
+      <p:grpSpPr>
+        <a:xfrm>
+          <a:off x="0" y="0"/>
+          <a:ext cx="0" cy="0"/>
+          <a:chOff x="0" y="0"/>
+          <a:chExt cx="0" cy="0"/>
+        </a:xfrm>
+      </p:grpSpPr>
+      <p:sp>
+        <p:nvSpPr>
+          <p:cNvPr id="2" name="Slide Image Placeholder 1"/>
+          <p:cNvSpPr>
+            <a:spLocks noGrp="1"/>
+          </p:cNvSpPr>
+          <p:nvPr>
+            <p:ph type="sldImg" idx="2"/>
+          </p:nvPr>
+        </p:nvSpPr>
+        <p:spPr/>
+      </p:sp>
+      <p:sp>
+        <p:nvSpPr>
+          <p:cNvPr id="3" name="Notes Placeholder 2"/>
+          <p:cNvSpPr>
+            <a:spLocks noGrp="1"/>
+          </p:cNvSpPr>
+          <p:nvPr>
+            <p:ph type="body" idx="3" sz="quarter"/>
+          </p:nvPr>
+        </p:nvSpPr>
+        <p:spPr/>
+        <p:txBody>
+          <a:bodyPr/>
+          <a:lstStyle/>
+          <a:p>
+            <a:r>
+              <a:t>Let me start with our Executive Summary.</a:t>
+            </a:r>
+          </a:p>
+          <a:p/>
+          <a:p>
+            <a:r>
+              <a:t>The total estimated Year 1 investment across all four technologies ranges from SGD 8.8 to 17.1 million, with projected annual returns of SGD 10.5 to 23 million in combined revenue and cost savings.</a:t>
+            </a:r>
+          </a:p>
+          <a:p/>
+          <a:p>
+            <a:r>
+              <a:t>The breakeven period is estimated at 1 to 2 years, and the combined five-year net return is approximately SGD 32.3 million.</a:t>
+            </a:r>
+          </a:p>
+          <a:p/>
+          <a:p>
+            <a:r>
+              <a:t>Here are the highlights for each technology:</a:t>
+            </a:r>
+          </a:p>
+          <a:p>
+            <a:r>
+              <a:t>AI can reduce administrative costs by SGD 2 to 4 million per year and improve student retention by 10 to 15 percent through adaptive learning and predictive analytics.</a:t>
+            </a:r>
+          </a:p>
+          <a:p>
+            <a:r>
+              <a:t>VR/AR can expand practical training capacity beyond physical lab constraints, with the potential to generate SGD 2 to 5 million per year in B2B licensing revenue.</a:t>
+            </a:r>
+          </a:p>
+          <a:p>
+            <a:r>
+              <a:t>5G and Edge Computing serve as the foundational infrastructure for a smart campus, lowering energy costs by 10 to 15 percent.</a:t>
+            </a:r>
+          </a:p>
+          <a:p>
+            <a:r>
+              <a:t>Blockchain can reduce credential verification processing time from days to seconds and cut manual verification labour by 50 to 70 percent.</a:t>
+            </a:r>
+          </a:p>
+          <a:p/>
+          <a:p>
+            <a:r>
+              <a:t>A phased three-year implementation roadmap manages risk while the four technologies reinforce one another to form a cohesive smart-campus ecosystem.</a:t>
+            </a:r>
+          </a:p>
+        </p:txBody>
+      </p:sp>
+      <p:sp>
+        <p:nvSpPr>
+          <p:cNvPr id="4" name="Slide Number Placeholder 3"/>
+          <p:cNvSpPr>
+            <a:spLocks noGrp="1"/>
+          </p:cNvSpPr>
+          <p:nvPr>
+            <p:ph type="sldNum" idx="5" sz="quarter"/>
+          </p:nvPr>
+        </p:nvSpPr>
+        <p:spPr/>
+      </p:sp>
+    </p:spTree>
+  </p:cSld>
+  <p:clrMapOvr>
+    <a:masterClrMapping/>
+  </p:clrMapOvr>
+</p:notes>
+</file>
+
+<file path=ppt/notesSlides/notesSlide5.xml><?xml version="1.0" encoding="utf-8"?>
+<p:notes xmlns:a="http://schemas.openxmlformats.org/drawingml/2006/main" xmlns:p="http://schemas.openxmlformats.org/presentationml/2006/main" xmlns:r="http://schemas.openxmlformats.org/officeDocument/2006/relationships">
+  <p:cSld>
+    <p:spTree>
+      <p:nvGrpSpPr>
+        <p:cNvPr id="1" name=""/>
+        <p:cNvGrpSpPr/>
+        <p:nvPr/>
+      </p:nvGrpSpPr>
+      <p:grpSpPr>
+        <a:xfrm>
+          <a:off x="0" y="0"/>
+          <a:ext cx="0" cy="0"/>
+          <a:chOff x="0" y="0"/>
+          <a:chExt cx="0" cy="0"/>
+        </a:xfrm>
+      </p:grpSpPr>
+      <p:sp>
+        <p:nvSpPr>
+          <p:cNvPr id="2" name="Slide Image Placeholder 1"/>
+          <p:cNvSpPr>
+            <a:spLocks noGrp="1"/>
+          </p:cNvSpPr>
+          <p:nvPr>
+            <p:ph type="sldImg" idx="2"/>
+          </p:nvPr>
+        </p:nvSpPr>
+        <p:spPr/>
+      </p:sp>
+      <p:sp>
+        <p:nvSpPr>
+          <p:cNvPr id="3" name="Notes Placeholder 2"/>
+          <p:cNvSpPr>
+            <a:spLocks noGrp="1"/>
+          </p:cNvSpPr>
+          <p:nvPr>
+            <p:ph type="body" idx="3" sz="quarter"/>
+          </p:nvPr>
+        </p:nvSpPr>
+        <p:spPr/>
+        <p:txBody>
+          <a:bodyPr/>
+          <a:lstStyle/>
+          <a:p>
+            <a:r>
+              <a:t>Now let us introduce our chosen organization, Nanyang Polytechnic.</a:t>
+            </a:r>
+          </a:p>
+          <a:p/>
+          <a:p>
+            <a:r>
+              <a:t>NYP is one of Singapore's five government-funded polytechnics, established in 1992 and located in Ang Mo Kio. It serves approximately 15,000 full-time students and thousands of continuing-education learners each year.</a:t>
+            </a:r>
+          </a:p>
+          <a:p/>
+          <a:p>
+            <a:r>
+              <a:t>NYP has six schools: School of Information Technology, School of Engineering, School of Business Management, School of Design and Media, School of Health and Social Sciences, and School of Applied Science.</a:t>
+            </a:r>
+          </a:p>
+          <a:p/>
+          <a:p>
+            <a:r>
+              <a:t>The annual operating budget is estimated at SGD 200 to 300 million, funded by the Ministry of Education, Singapore.</a:t>
+            </a:r>
+          </a:p>
+          <a:p/>
+          <a:p>
+            <a:r>
+              <a:t>NYP's mission is to nurture industry-ready professionals through practice-oriented education, empowering learners for work and life, and co-creating with industry for growth and sustainability.</a:t>
+            </a:r>
+          </a:p>
+        </p:txBody>
+      </p:sp>
+      <p:sp>
+        <p:nvSpPr>
+          <p:cNvPr id="4" name="Slide Number Placeholder 3"/>
+          <p:cNvSpPr>
+            <a:spLocks noGrp="1"/>
+          </p:cNvSpPr>
+          <p:nvPr>
+            <p:ph type="sldNum" idx="5" sz="quarter"/>
+          </p:nvPr>
+        </p:nvSpPr>
+        <p:spPr/>
+      </p:sp>
+    </p:spTree>
+  </p:cSld>
+  <p:clrMapOvr>
+    <a:masterClrMapping/>
+  </p:clrMapOvr>
+</p:notes>
+</file>
+
+<file path=ppt/notesSlides/notesSlide6.xml><?xml version="1.0" encoding="utf-8"?>
+<p:notes xmlns:a="http://schemas.openxmlformats.org/drawingml/2006/main" xmlns:p="http://schemas.openxmlformats.org/presentationml/2006/main" xmlns:r="http://schemas.openxmlformats.org/officeDocument/2006/relationships">
+  <p:cSld>
+    <p:spTree>
+      <p:nvGrpSpPr>
+        <p:cNvPr id="1" name=""/>
+        <p:cNvGrpSpPr/>
+        <p:nvPr/>
+      </p:nvGrpSpPr>
+      <p:grpSpPr>
+        <a:xfrm>
+          <a:off x="0" y="0"/>
+          <a:ext cx="0" cy="0"/>
+          <a:chOff x="0" y="0"/>
+          <a:chExt cx="0" cy="0"/>
+        </a:xfrm>
+      </p:grpSpPr>
+      <p:sp>
+        <p:nvSpPr>
+          <p:cNvPr id="2" name="Slide Image Placeholder 1"/>
+          <p:cNvSpPr>
+            <a:spLocks noGrp="1"/>
+          </p:cNvSpPr>
+          <p:nvPr>
+            <p:ph type="sldImg" idx="2"/>
+          </p:nvPr>
+        </p:nvSpPr>
+        <p:spPr/>
+      </p:sp>
+      <p:sp>
+        <p:nvSpPr>
+          <p:cNvPr id="3" name="Notes Placeholder 2"/>
+          <p:cNvSpPr>
+            <a:spLocks noGrp="1"/>
+          </p:cNvSpPr>
+          <p:nvPr>
+            <p:ph type="body" idx="3" sz="quarter"/>
+          </p:nvPr>
+        </p:nvSpPr>
+        <p:spPr/>
+        <p:txBody>
+          <a:bodyPr/>
+          <a:lstStyle/>
+          <a:p>
+            <a:r>
+              <a:t>This slide shows NYP's Educational Value Chain, which encompasses the end-to-end activities that deliver value to its primary customers — students — and its secondary stakeholders — employers, industry partners, and the government.</a:t>
+            </a:r>
+          </a:p>
+          <a:p/>
+          <a:p>
+            <a:r>
+              <a:t>The value chain consists of eight key activities:</a:t>
+            </a:r>
+          </a:p>
+          <a:p>
+            <a:r>
+              <a:t>1. Student Recruitment and Admissions — Marketing, outreach, application processing.</a:t>
+            </a:r>
+          </a:p>
+          <a:p>
+            <a:r>
+              <a:t>2. Curriculum Design and Development — Course creation, industry alignment, pedagogy innovation.</a:t>
+            </a:r>
+          </a:p>
+          <a:p>
+            <a:r>
+              <a:t>3. Teaching and Learning Delivery — Lectures, tutorials, lab sessions, online learning.</a:t>
+            </a:r>
+          </a:p>
+          <a:p>
+            <a:r>
+              <a:t>4. Student Support Services — Counseling, career guidance, financial aid.</a:t>
+            </a:r>
+          </a:p>
+          <a:p>
+            <a:r>
+              <a:t>5. Assessment and Certification — Examinations, grading, diploma issuance, certificate verification.</a:t>
+            </a:r>
+          </a:p>
+          <a:p>
+            <a:r>
+              <a:t>6. Industry Partnerships and Internships — Collaboration with companies for practical training.</a:t>
+            </a:r>
+          </a:p>
+          <a:p>
+            <a:r>
+              <a:t>7. Continuing Education and Training (CET) — Lifelong learning programs for working adults.</a:t>
+            </a:r>
+          </a:p>
+          <a:p>
+            <a:r>
+              <a:t>8. Campus Operations and Infrastructure — Facilities management, IT systems, security.</a:t>
+            </a:r>
+          </a:p>
+          <a:p/>
+          <a:p>
+            <a:r>
+              <a:t>Each activity represents an area where emerging technologies can create measurable improvements. Our four proposed technologies address challenges across the entire value chain.</a:t>
+            </a:r>
+          </a:p>
+        </p:txBody>
+      </p:sp>
+      <p:sp>
+        <p:nvSpPr>
+          <p:cNvPr id="4" name="Slide Number Placeholder 3"/>
+          <p:cNvSpPr>
+            <a:spLocks noGrp="1"/>
+          </p:cNvSpPr>
+          <p:nvPr>
+            <p:ph type="sldNum" idx="5" sz="quarter"/>
+          </p:nvPr>
+        </p:nvSpPr>
+        <p:spPr/>
+      </p:sp>
+    </p:spTree>
+  </p:cSld>
+  <p:clrMapOvr>
+    <a:masterClrMapping/>
+  </p:clrMapOvr>
+</p:notes>
+</file>
+
+<file path=ppt/notesSlides/notesSlide7.xml><?xml version="1.0" encoding="utf-8"?>
+<p:notes xmlns:a="http://schemas.openxmlformats.org/drawingml/2006/main" xmlns:p="http://schemas.openxmlformats.org/presentationml/2006/main" xmlns:r="http://schemas.openxmlformats.org/officeDocument/2006/relationships">
+  <p:cSld>
+    <p:spTree>
+      <p:nvGrpSpPr>
+        <p:cNvPr id="1" name=""/>
+        <p:cNvGrpSpPr/>
+        <p:nvPr/>
+      </p:nvGrpSpPr>
+      <p:grpSpPr>
+        <a:xfrm>
+          <a:off x="0" y="0"/>
+          <a:ext cx="0" cy="0"/>
+          <a:chOff x="0" y="0"/>
+          <a:chExt cx="0" cy="0"/>
+        </a:xfrm>
+      </p:grpSpPr>
+      <p:sp>
+        <p:nvSpPr>
+          <p:cNvPr id="2" name="Slide Image Placeholder 1"/>
+          <p:cNvSpPr>
+            <a:spLocks noGrp="1"/>
+          </p:cNvSpPr>
+          <p:nvPr>
+            <p:ph type="sldImg" idx="2"/>
+          </p:nvPr>
+        </p:nvSpPr>
+        <p:spPr/>
+      </p:sp>
+      <p:sp>
+        <p:nvSpPr>
+          <p:cNvPr id="3" name="Notes Placeholder 2"/>
+          <p:cNvSpPr>
+            <a:spLocks noGrp="1"/>
+          </p:cNvSpPr>
+          <p:nvPr>
+            <p:ph type="body" idx="3" sz="quarter"/>
+          </p:nvPr>
+        </p:nvSpPr>
+        <p:spPr/>
+        <p:txBody>
+          <a:bodyPr/>
+          <a:lstStyle/>
+          <a:p>
+            <a:r>
+              <a:t>NYP faces six pressing challenges that directly affect specific stages of its value chain.</a:t>
+            </a:r>
+          </a:p>
+          <a:p/>
+          <a:p>
+            <a:r>
+              <a:t>First, Scalability of Personalised Learning: With approximately 15,000 full-time students across diverse disciplines, providing personalized learning experiences is a significant challenge. Lecturers have large class sizes, making it difficult to tailor content to individual learning needs. This impacts Teaching and Learning.</a:t>
+            </a:r>
+          </a:p>
+          <a:p/>
+          <a:p>
+            <a:r>
+              <a:t>Second, Limited Hands-On Training: Many courses, particularly in engineering, healthcare, and applied sciences, require hands-on practical training. However, physical lab spaces are limited and expensive to maintain. Equipment may be outdated or insufficient. This affects Teaching and Learning, as well as Industry Partnerships.</a:t>
+            </a:r>
+          </a:p>
+          <a:p/>
+          <a:p>
+            <a:r>
+              <a:t>Third, Campus Connectivity Limitations: The existing network infrastructure faces bandwidth bottlenecks during peak hours with thousands of devices connecting simultaneously. This impacts Campus Operations.</a:t>
+            </a:r>
+          </a:p>
+          <a:p/>
+          <a:p>
+            <a:r>
+              <a:t>Fourth, Certificate Fraud and Verification Delays: Verification of academic credentials is a time-consuming, manual process taking 3 to 10 working days. This affects Assessment and Certification.</a:t>
+            </a:r>
+          </a:p>
+          <a:p/>
+          <a:p>
+            <a:r>
+              <a:t>Fifth, Rising Competition: NYP competes with other polytechnics, universities, and private education institutions for student enrollment. This impacts Recruitment.</a:t>
+            </a:r>
+          </a:p>
+          <a:p/>
+          <a:p>
+            <a:r>
+              <a:t>Sixth, Environmental and Sustainability Concerns: Singapore faces environmental challenges including climate change and energy consumption. NYP has a responsibility to reduce its carbon footprint in line with the SG Green Plan 2030. This affects Campus Operations.</a:t>
+            </a:r>
+          </a:p>
+        </p:txBody>
+      </p:sp>
+      <p:sp>
+        <p:nvSpPr>
+          <p:cNvPr id="4" name="Slide Number Placeholder 3"/>
+          <p:cNvSpPr>
+            <a:spLocks noGrp="1"/>
+          </p:cNvSpPr>
+          <p:nvPr>
+            <p:ph type="sldNum" idx="5" sz="quarter"/>
+          </p:nvPr>
+        </p:nvSpPr>
+        <p:spPr/>
+      </p:sp>
+    </p:spTree>
+  </p:cSld>
+  <p:clrMapOvr>
+    <a:masterClrMapping/>
+  </p:clrMapOvr>
+</p:notes>
+</file>
+
+<file path=ppt/notesSlides/notesSlide8.xml><?xml version="1.0" encoding="utf-8"?>
+<p:notes xmlns:a="http://schemas.openxmlformats.org/drawingml/2006/main" xmlns:p="http://schemas.openxmlformats.org/presentationml/2006/main" xmlns:r="http://schemas.openxmlformats.org/officeDocument/2006/relationships">
+  <p:cSld>
+    <p:spTree>
+      <p:nvGrpSpPr>
+        <p:cNvPr id="1" name=""/>
+        <p:cNvGrpSpPr/>
+        <p:nvPr/>
+      </p:nvGrpSpPr>
+      <p:grpSpPr>
+        <a:xfrm>
+          <a:off x="0" y="0"/>
+          <a:ext cx="0" cy="0"/>
+          <a:chOff x="0" y="0"/>
+          <a:chExt cx="0" cy="0"/>
+        </a:xfrm>
+      </p:grpSpPr>
+      <p:sp>
+        <p:nvSpPr>
+          <p:cNvPr id="2" name="Slide Image Placeholder 1"/>
+          <p:cNvSpPr>
+            <a:spLocks noGrp="1"/>
+          </p:cNvSpPr>
+          <p:nvPr>
+            <p:ph type="sldImg" idx="2"/>
+          </p:nvPr>
+        </p:nvSpPr>
+        <p:spPr/>
+      </p:sp>
+      <p:sp>
+        <p:nvSpPr>
+          <p:cNvPr id="3" name="Notes Placeholder 2"/>
+          <p:cNvSpPr>
+            <a:spLocks noGrp="1"/>
+          </p:cNvSpPr>
+          <p:nvPr>
+            <p:ph type="body" idx="3" sz="quarter"/>
+          </p:nvPr>
+        </p:nvSpPr>
+        <p:spPr/>
+        <p:txBody>
+          <a:bodyPr/>
+          <a:lstStyle/>
+          <a:p>
+            <a:r>
+              <a:t>Now let us look at the market opportunity.</a:t>
+            </a:r>
+          </a:p>
+          <a:p/>
+          <a:p>
+            <a:r>
+              <a:t>The Singapore government allocates approximately SGD 13 billion annually to education, which is about 15 to 20 percent of the national budget, making it the second-largest area of government spending.</a:t>
+            </a:r>
+          </a:p>
+          <a:p/>
+          <a:p>
+            <a:r>
+              <a:t>The five polytechnics collectively enroll approximately 70,000 full-time students. NYP captures approximately 21 percent of the polytechnic market with its 15,000 students.</a:t>
+            </a:r>
+          </a:p>
+          <a:p/>
+          <a:p>
+            <a:r>
+              <a:t>The global Education Technology market is estimated at USD 340 billion in 2024, projected to reach USD 605 billion by 2027, representing a compound annual growth rate of approximately 16 percent. The Asia-Pacific EdTech market is estimated at USD 115 billion, growing at approximately 18 percent.</a:t>
+            </a:r>
+          </a:p>
+          <a:p/>
+          <a:p>
+            <a:r>
+              <a:t>Singapore's EdTech market is estimated at SGD 1.5 to 2 billion, driven by government support through SkillsFuture and IMDA initiatives.</a:t>
+            </a:r>
+          </a:p>
+          <a:p/>
+          <a:p>
+            <a:r>
+              <a:t>By adopting emerging technologies, NYP can unlock new revenue streams including AI-powered CET courses generating SGD 5 to 10 million, VR content licensing generating SGD 2 to 5 million, blockchain verification services, and smart-campus consulting. The total potential additional revenue is SGD 9.5 to 21 million per year.</a:t>
+            </a:r>
+          </a:p>
+        </p:txBody>
+      </p:sp>
+      <p:sp>
+        <p:nvSpPr>
+          <p:cNvPr id="4" name="Slide Number Placeholder 3"/>
+          <p:cNvSpPr>
+            <a:spLocks noGrp="1"/>
+          </p:cNvSpPr>
+          <p:nvPr>
+            <p:ph type="sldNum" idx="5" sz="quarter"/>
+          </p:nvPr>
+        </p:nvSpPr>
+        <p:spPr/>
+      </p:sp>
+    </p:spTree>
+  </p:cSld>
+  <p:clrMapOvr>
+    <a:masterClrMapping/>
+  </p:clrMapOvr>
+</p:notes>
+</file>
+
+<file path=ppt/notesSlides/notesSlide9.xml><?xml version="1.0" encoding="utf-8"?>
+<p:notes xmlns:a="http://schemas.openxmlformats.org/drawingml/2006/main" xmlns:p="http://schemas.openxmlformats.org/presentationml/2006/main" xmlns:r="http://schemas.openxmlformats.org/officeDocument/2006/relationships">
+  <p:cSld>
+    <p:spTree>
+      <p:nvGrpSpPr>
+        <p:cNvPr id="1" name=""/>
+        <p:cNvGrpSpPr/>
+        <p:nvPr/>
+      </p:nvGrpSpPr>
+      <p:grpSpPr>
+        <a:xfrm>
+          <a:off x="0" y="0"/>
+          <a:ext cx="0" cy="0"/>
+          <a:chOff x="0" y="0"/>
+          <a:chExt cx="0" cy="0"/>
+        </a:xfrm>
+      </p:grpSpPr>
+      <p:sp>
+        <p:nvSpPr>
+          <p:cNvPr id="2" name="Slide Image Placeholder 1"/>
+          <p:cNvSpPr>
+            <a:spLocks noGrp="1"/>
+          </p:cNvSpPr>
+          <p:nvPr>
+            <p:ph type="sldImg" idx="2"/>
+          </p:nvPr>
+        </p:nvSpPr>
+        <p:spPr/>
+      </p:sp>
+      <p:sp>
+        <p:nvSpPr>
+          <p:cNvPr id="3" name="Notes Placeholder 2"/>
+          <p:cNvSpPr>
+            <a:spLocks noGrp="1"/>
+          </p:cNvSpPr>
+          <p:nvPr>
+            <p:ph type="body" idx="3" sz="quarter"/>
+          </p:nvPr>
+        </p:nvSpPr>
+        <p:spPr/>
+        <p:txBody>
+          <a:bodyPr/>
+          <a:lstStyle/>
+          <a:p>
+            <a:r>
+              <a:t>We will now move into the core of our presentation: the four emerging technology solutions.</a:t>
+            </a:r>
+          </a:p>
+          <a:p/>
+          <a:p>
+            <a:r>
+              <a:t>Each team member will present their assigned technology and explain how it maps to NYP's value chain. The four technologies are Artificial Intelligence, Immersive Media (VR/AR), 5G and Edge Computing, and Blockchain-Based Certificate Verification.</a:t>
+            </a:r>
+          </a:p>
+          <a:p/>
+          <a:p>
+            <a:r>
+              <a:t>As shown in our Technology-to-Value-Chain Alignment Matrix, every part of NYP's value chain benefits from at least one of these technologies, ensuring comprehensive coverage of the organization's needs.</a:t>
+            </a:r>
+          </a:p>
+        </p:txBody>
+      </p:sp>
+      <p:sp>
+        <p:nvSpPr>
+          <p:cNvPr id="4" name="Slide Number Placeholder 3"/>
+          <p:cNvSpPr>
+            <a:spLocks noGrp="1"/>
+          </p:cNvSpPr>
+          <p:nvPr>
+            <p:ph type="sldNum" idx="5" sz="quarter"/>
+          </p:nvPr>
+        </p:nvSpPr>
+        <p:spPr/>
+      </p:sp>
+    </p:spTree>
   </p:cSld>
   <p:clrMapOvr>
     <a:masterClrMapping/>

</xml_diff>

<commit_message>
Update slide 2 numbering to vertical order in Slides.pptx
Co-authored-by: alanpaul1382-sketch <261784266+alanpaul1382-sketch@users.noreply.github.com>
</commit_message>
<xml_diff>
--- a/Slides.pptx
+++ b/Slides.pptx
@@ -21379,7 +21379,7 @@
                   <a:srgbClr val="FFFFFF"/>
                 </a:solidFill>
               </a:rPr>
-              <a:t>2</a:t>
+              <a:t>5</a:t>
             </a:r>
           </a:p>
         </p:txBody>
@@ -21509,7 +21509,7 @@
                   <a:srgbClr val="FFFFFF"/>
                 </a:solidFill>
               </a:rPr>
-              <a:t>3</a:t>
+              <a:t>2</a:t>
             </a:r>
             <a:endParaRPr sz="2200" dirty="0">
               <a:solidFill>
@@ -21635,7 +21635,7 @@
                   <a:srgbClr val="FFFFFF"/>
                 </a:solidFill>
               </a:rPr>
-              <a:t>4</a:t>
+              <a:t>6</a:t>
             </a:r>
           </a:p>
         </p:txBody>
@@ -21755,30 +21755,10 @@
                 <a:srgbClr val="FFFFFF"/>
               </a:solidFill>
             </a:endParaRPr>
-          </a:p>
-          <a:p>
-            <a:pPr algn="ctr"/>
-            <a:r>
-              <a:rPr lang="en-SG" sz="2200" dirty="0">
-                <a:solidFill>
-                  <a:srgbClr val="FFFFFF"/>
-                </a:solidFill>
-              </a:rPr>
-              <a:t>5</a:t>
-            </a:r>
-            <a:endParaRPr lang="en-US" sz="2200" dirty="0">
-              <a:solidFill>
-                <a:srgbClr val="FFFFFF"/>
-              </a:solidFill>
-            </a:endParaRPr>
-          </a:p>
-          <a:p>
-            <a:pPr algn="ctr"/>
-            <a:endParaRPr sz="2200" dirty="0">
-              <a:solidFill>
-                <a:srgbClr val="FFFFFF"/>
-              </a:solidFill>
-            </a:endParaRPr>
+            <a:r>
+              <a:rPr lang="en-US" dirty="0"/>
+              <a:t>3</a:t>
+            </a:r>
           </a:p>
         </p:txBody>
       </p:sp>
@@ -21907,7 +21887,7 @@
                   <a:srgbClr val="FFFFFF"/>
                 </a:solidFill>
               </a:rPr>
-              <a:t>6</a:t>
+              <a:t>7</a:t>
             </a:r>
           </a:p>
         </p:txBody>
@@ -22061,7 +22041,7 @@
                   <a:srgbClr val="FFFFFF"/>
                 </a:solidFill>
               </a:rPr>
-              <a:t>7</a:t>
+              <a:t>4</a:t>
             </a:r>
           </a:p>
         </p:txBody>

</xml_diff>